<commit_message>
Refactoring of SDLC models.pptx
</commit_message>
<xml_diff>
--- a/6.SDLC/SDLC models.pptx
+++ b/6.SDLC/SDLC models.pptx
@@ -5,7 +5,7 @@
     <p:sldMasterId id="2147483648" r:id="rId1"/>
   </p:sldMasterIdLst>
   <p:handoutMasterIdLst>
-    <p:handoutMasterId r:id="rId24"/>
+    <p:handoutMasterId r:id="rId26"/>
   </p:handoutMasterIdLst>
   <p:sldIdLst>
     <p:sldId id="291" r:id="rId2"/>
@@ -15,21 +15,23 @@
     <p:sldId id="307" r:id="rId6"/>
     <p:sldId id="308" r:id="rId7"/>
     <p:sldId id="262" r:id="rId8"/>
-    <p:sldId id="309" r:id="rId9"/>
-    <p:sldId id="299" r:id="rId10"/>
-    <p:sldId id="310" r:id="rId11"/>
-    <p:sldId id="311" r:id="rId12"/>
-    <p:sldId id="257" r:id="rId13"/>
-    <p:sldId id="312" r:id="rId14"/>
-    <p:sldId id="286" r:id="rId15"/>
-    <p:sldId id="287" r:id="rId16"/>
-    <p:sldId id="288" r:id="rId17"/>
-    <p:sldId id="282" r:id="rId18"/>
-    <p:sldId id="279" r:id="rId19"/>
+    <p:sldId id="314" r:id="rId9"/>
+    <p:sldId id="309" r:id="rId10"/>
+    <p:sldId id="315" r:id="rId11"/>
+    <p:sldId id="299" r:id="rId12"/>
+    <p:sldId id="316" r:id="rId13"/>
+    <p:sldId id="311" r:id="rId14"/>
+    <p:sldId id="310" r:id="rId15"/>
+    <p:sldId id="257" r:id="rId16"/>
+    <p:sldId id="312" r:id="rId17"/>
+    <p:sldId id="286" r:id="rId18"/>
+    <p:sldId id="288" r:id="rId19"/>
     <p:sldId id="281" r:id="rId20"/>
     <p:sldId id="269" r:id="rId21"/>
-    <p:sldId id="260" r:id="rId22"/>
-    <p:sldId id="313" r:id="rId23"/>
+    <p:sldId id="279" r:id="rId22"/>
+    <p:sldId id="282" r:id="rId23"/>
+    <p:sldId id="260" r:id="rId24"/>
+    <p:sldId id="313" r:id="rId25"/>
   </p:sldIdLst>
   <p:sldSz cx="9144000" cy="6858000" type="screen4x3"/>
   <p:notesSz cx="6858000" cy="9144000"/>
@@ -232,7 +234,7 @@
           <a:p>
             <a:fld id="{E14AF66C-D44D-4D17-A1A6-B83F81608EA7}" type="datetimeFigureOut">
               <a:rPr lang="ru-RU" smtClean="0"/>
-              <a:t>19.02.2013</a:t>
+              <a:t>15.12.2014</a:t>
             </a:fld>
             <a:endParaRPr lang="ru-RU"/>
           </a:p>
@@ -497,7 +499,7 @@
             <a:fld id="{1D8BD707-D9CF-40AE-B4C6-C98DA3205C09}" type="datetimeFigureOut">
               <a:rPr lang="en-US" smtClean="0"/>
               <a:pPr/>
-              <a:t>2/19/2013</a:t>
+              <a:t>12/15/2014</a:t>
             </a:fld>
             <a:endParaRPr lang="en-US"/>
           </a:p>
@@ -664,7 +666,7 @@
             <a:fld id="{1D8BD707-D9CF-40AE-B4C6-C98DA3205C09}" type="datetimeFigureOut">
               <a:rPr lang="en-US" smtClean="0"/>
               <a:pPr/>
-              <a:t>2/19/2013</a:t>
+              <a:t>12/15/2014</a:t>
             </a:fld>
             <a:endParaRPr lang="en-US"/>
           </a:p>
@@ -841,7 +843,7 @@
             <a:fld id="{1D8BD707-D9CF-40AE-B4C6-C98DA3205C09}" type="datetimeFigureOut">
               <a:rPr lang="en-US" smtClean="0"/>
               <a:pPr/>
-              <a:t>2/19/2013</a:t>
+              <a:t>12/15/2014</a:t>
             </a:fld>
             <a:endParaRPr lang="en-US"/>
           </a:p>
@@ -1012,7 +1014,7 @@
             <a:fld id="{1D8BD707-D9CF-40AE-B4C6-C98DA3205C09}" type="datetimeFigureOut">
               <a:rPr lang="en-US" smtClean="0"/>
               <a:pPr/>
-              <a:t>2/19/2013</a:t>
+              <a:t>12/15/2014</a:t>
             </a:fld>
             <a:endParaRPr lang="en-US"/>
           </a:p>
@@ -1255,7 +1257,7 @@
             <a:fld id="{1D8BD707-D9CF-40AE-B4C6-C98DA3205C09}" type="datetimeFigureOut">
               <a:rPr lang="en-US" smtClean="0"/>
               <a:pPr/>
-              <a:t>2/19/2013</a:t>
+              <a:t>12/15/2014</a:t>
             </a:fld>
             <a:endParaRPr lang="en-US"/>
           </a:p>
@@ -1540,7 +1542,7 @@
             <a:fld id="{1D8BD707-D9CF-40AE-B4C6-C98DA3205C09}" type="datetimeFigureOut">
               <a:rPr lang="en-US" smtClean="0"/>
               <a:pPr/>
-              <a:t>2/19/2013</a:t>
+              <a:t>12/15/2014</a:t>
             </a:fld>
             <a:endParaRPr lang="en-US"/>
           </a:p>
@@ -1959,7 +1961,7 @@
             <a:fld id="{1D8BD707-D9CF-40AE-B4C6-C98DA3205C09}" type="datetimeFigureOut">
               <a:rPr lang="en-US" smtClean="0"/>
               <a:pPr/>
-              <a:t>2/19/2013</a:t>
+              <a:t>12/15/2014</a:t>
             </a:fld>
             <a:endParaRPr lang="en-US"/>
           </a:p>
@@ -2074,7 +2076,7 @@
             <a:fld id="{1D8BD707-D9CF-40AE-B4C6-C98DA3205C09}" type="datetimeFigureOut">
               <a:rPr lang="en-US" smtClean="0"/>
               <a:pPr/>
-              <a:t>2/19/2013</a:t>
+              <a:t>12/15/2014</a:t>
             </a:fld>
             <a:endParaRPr lang="en-US"/>
           </a:p>
@@ -2166,7 +2168,7 @@
             <a:fld id="{1D8BD707-D9CF-40AE-B4C6-C98DA3205C09}" type="datetimeFigureOut">
               <a:rPr lang="en-US" smtClean="0"/>
               <a:pPr/>
-              <a:t>2/19/2013</a:t>
+              <a:t>12/15/2014</a:t>
             </a:fld>
             <a:endParaRPr lang="en-US"/>
           </a:p>
@@ -2440,7 +2442,7 @@
             <a:fld id="{1D8BD707-D9CF-40AE-B4C6-C98DA3205C09}" type="datetimeFigureOut">
               <a:rPr lang="en-US" smtClean="0"/>
               <a:pPr/>
-              <a:t>2/19/2013</a:t>
+              <a:t>12/15/2014</a:t>
             </a:fld>
             <a:endParaRPr lang="en-US"/>
           </a:p>
@@ -2690,7 +2692,7 @@
             <a:fld id="{1D8BD707-D9CF-40AE-B4C6-C98DA3205C09}" type="datetimeFigureOut">
               <a:rPr lang="en-US" smtClean="0"/>
               <a:pPr/>
-              <a:t>2/19/2013</a:t>
+              <a:t>12/15/2014</a:t>
             </a:fld>
             <a:endParaRPr lang="en-US"/>
           </a:p>
@@ -2909,7 +2911,7 @@
             <a:fld id="{1D8BD707-D9CF-40AE-B4C6-C98DA3205C09}" type="datetimeFigureOut">
               <a:rPr lang="en-US" smtClean="0"/>
               <a:pPr/>
-              <a:t>2/19/2013</a:t>
+              <a:t>12/15/2014</a:t>
             </a:fld>
             <a:endParaRPr lang="en-US"/>
           </a:p>
@@ -3630,14 +3632,952 @@
       </p:grpSpPr>
       <p:sp>
         <p:nvSpPr>
-          <p:cNvPr id="4" name="TextBox 3"/>
+          <p:cNvPr id="3" name="Content Placeholder 2"/>
+          <p:cNvSpPr>
+            <a:spLocks noGrp="1"/>
+          </p:cNvSpPr>
+          <p:nvPr>
+            <p:ph idx="1"/>
+          </p:nvPr>
+        </p:nvSpPr>
+        <p:spPr>
+          <a:xfrm>
+            <a:off x="457200" y="834972"/>
+            <a:ext cx="8229600" cy="5291192"/>
+          </a:xfrm>
+        </p:spPr>
+        <p:txBody>
+          <a:bodyPr>
+            <a:normAutofit fontScale="70000" lnSpcReduction="20000"/>
+          </a:bodyPr>
+          <a:lstStyle/>
+          <a:p>
+            <a:pPr marL="0" indent="0">
+              <a:buNone/>
+            </a:pPr>
+            <a:r>
+              <a:rPr lang="en-US" b="1" dirty="0"/>
+              <a:t>Advantages of V-model:</a:t>
+            </a:r>
+            <a:endParaRPr lang="en-US" dirty="0"/>
+          </a:p>
+          <a:p>
+            <a:r>
+              <a:rPr lang="en-US" dirty="0"/>
+              <a:t>Simple and easy to use.</a:t>
+            </a:r>
+          </a:p>
+          <a:p>
+            <a:r>
+              <a:rPr lang="en-US" dirty="0"/>
+              <a:t>Testing activities like planning, </a:t>
+            </a:r>
+            <a:r>
+              <a:rPr lang="en-US" dirty="0" smtClean="0"/>
+              <a:t>test designing happens </a:t>
+            </a:r>
+            <a:r>
+              <a:rPr lang="en-US" dirty="0"/>
+              <a:t>well before coding. This saves a lot of time. Hence higher chance of success over the waterfall model.</a:t>
+            </a:r>
+          </a:p>
+          <a:p>
+            <a:r>
+              <a:rPr lang="en-US" dirty="0"/>
+              <a:t>Proactive defect tracking – that is defects are found at early stage.</a:t>
+            </a:r>
+          </a:p>
+          <a:p>
+            <a:r>
+              <a:rPr lang="en-US" dirty="0"/>
+              <a:t>Avoids the downward flow of the defects.</a:t>
+            </a:r>
+          </a:p>
+          <a:p>
+            <a:r>
+              <a:rPr lang="en-US" dirty="0"/>
+              <a:t>Works well for small projects where requirements are easily understood</a:t>
+            </a:r>
+            <a:r>
+              <a:rPr lang="en-US" dirty="0" smtClean="0"/>
+              <a:t>.</a:t>
+            </a:r>
+          </a:p>
+          <a:p>
+            <a:pPr marL="0" indent="0">
+              <a:buNone/>
+            </a:pPr>
+            <a:endParaRPr lang="en-US" dirty="0"/>
+          </a:p>
+          <a:p>
+            <a:pPr marL="0" indent="0">
+              <a:buNone/>
+            </a:pPr>
+            <a:r>
+              <a:rPr lang="en-US" b="1" dirty="0"/>
+              <a:t>Disadvantages of V-model:</a:t>
+            </a:r>
+            <a:endParaRPr lang="en-US" dirty="0"/>
+          </a:p>
+          <a:p>
+            <a:r>
+              <a:rPr lang="en-US" dirty="0"/>
+              <a:t>Very rigid and least flexible.</a:t>
+            </a:r>
+          </a:p>
+          <a:p>
+            <a:r>
+              <a:rPr lang="en-US" dirty="0"/>
+              <a:t>Software is developed during the implementation phase, so no early prototypes of the software are produced.</a:t>
+            </a:r>
+          </a:p>
+          <a:p>
+            <a:r>
+              <a:rPr lang="en-US" dirty="0"/>
+              <a:t>If any changes happen in midway, then the test documents along with requirement documents has to be updated.</a:t>
+            </a:r>
+          </a:p>
+          <a:p>
+            <a:endParaRPr lang="en-US" dirty="0"/>
+          </a:p>
+        </p:txBody>
+      </p:sp>
+      <p:sp>
+        <p:nvSpPr>
+          <p:cNvPr id="4" name="Title 3"/>
+          <p:cNvSpPr txBox="1">
+            <a:spLocks noGrp="1"/>
+          </p:cNvSpPr>
+          <p:nvPr>
+            <p:ph type="title"/>
+          </p:nvPr>
+        </p:nvSpPr>
+        <p:spPr>
+          <a:xfrm>
+            <a:off x="3059832" y="188640"/>
+            <a:ext cx="2520280" cy="646331"/>
+          </a:xfrm>
+          <a:prstGeom prst="rect">
+            <a:avLst/>
+          </a:prstGeom>
+          <a:noFill/>
+        </p:spPr>
+        <p:txBody>
+          <a:bodyPr wrap="square" rtlCol="0">
+            <a:spAutoFit/>
+          </a:bodyPr>
+          <a:lstStyle/>
+          <a:p>
+            <a:pPr algn="ctr"/>
+            <a:r>
+              <a:rPr lang="en-US" sz="3600" dirty="0" smtClean="0">
+                <a:solidFill>
+                  <a:schemeClr val="tx1">
+                    <a:lumMod val="50000"/>
+                    <a:lumOff val="50000"/>
+                  </a:schemeClr>
+                </a:solidFill>
+              </a:rPr>
+              <a:t>V-model</a:t>
+            </a:r>
+            <a:endParaRPr lang="en-US" sz="3600" dirty="0">
+              <a:solidFill>
+                <a:schemeClr val="tx1">
+                  <a:lumMod val="50000"/>
+                  <a:lumOff val="50000"/>
+                </a:schemeClr>
+              </a:solidFill>
+              <a:effectLst>
+                <a:outerShdw blurRad="38100" dist="38100" dir="2700000" algn="tl">
+                  <a:srgbClr val="000000">
+                    <a:alpha val="43137"/>
+                  </a:srgbClr>
+                </a:outerShdw>
+              </a:effectLst>
+            </a:endParaRPr>
+          </a:p>
+        </p:txBody>
+      </p:sp>
+    </p:spTree>
+    <p:extLst>
+      <p:ext uri="{BB962C8B-B14F-4D97-AF65-F5344CB8AC3E}">
+        <p14:creationId xmlns:p14="http://schemas.microsoft.com/office/powerpoint/2010/main" val="470803691"/>
+      </p:ext>
+    </p:extLst>
+  </p:cSld>
+  <p:clrMapOvr>
+    <a:masterClrMapping/>
+  </p:clrMapOvr>
+</p:sld>
+</file>
+
+<file path=ppt/slides/slide11.xml><?xml version="1.0" encoding="utf-8"?>
+<p:sld xmlns:a="http://schemas.openxmlformats.org/drawingml/2006/main" xmlns:r="http://schemas.openxmlformats.org/officeDocument/2006/relationships" xmlns:p="http://schemas.openxmlformats.org/presentationml/2006/main">
+  <p:cSld>
+    <p:spTree>
+      <p:nvGrpSpPr>
+        <p:cNvPr id="1" name=""/>
+        <p:cNvGrpSpPr/>
+        <p:nvPr/>
+      </p:nvGrpSpPr>
+      <p:grpSpPr>
+        <a:xfrm>
+          <a:off x="0" y="0"/>
+          <a:ext cx="0" cy="0"/>
+          <a:chOff x="0" y="0"/>
+          <a:chExt cx="0" cy="0"/>
+        </a:xfrm>
+      </p:grpSpPr>
+      <p:sp>
+        <p:nvSpPr>
+          <p:cNvPr id="5" name="Rectangle 4"/>
+          <p:cNvSpPr/>
+          <p:nvPr/>
+        </p:nvSpPr>
+        <p:spPr>
+          <a:xfrm>
+            <a:off x="1763688" y="2763125"/>
+            <a:ext cx="1584176" cy="720080"/>
+          </a:xfrm>
+          <a:prstGeom prst="rect">
+            <a:avLst/>
+          </a:prstGeom>
+          <a:noFill/>
+          <a:ln w="12700">
+            <a:solidFill>
+              <a:schemeClr val="tx1">
+                <a:lumMod val="50000"/>
+                <a:lumOff val="50000"/>
+              </a:schemeClr>
+            </a:solidFill>
+          </a:ln>
+        </p:spPr>
+        <p:style>
+          <a:lnRef idx="1">
+            <a:schemeClr val="accent5"/>
+          </a:lnRef>
+          <a:fillRef idx="3">
+            <a:schemeClr val="accent5"/>
+          </a:fillRef>
+          <a:effectRef idx="2">
+            <a:schemeClr val="accent5"/>
+          </a:effectRef>
+          <a:fontRef idx="minor">
+            <a:schemeClr val="lt1"/>
+          </a:fontRef>
+        </p:style>
+        <p:txBody>
+          <a:bodyPr rtlCol="0" anchor="ctr"/>
+          <a:lstStyle/>
+          <a:p>
+            <a:pPr algn="ctr"/>
+            <a:r>
+              <a:rPr lang="en-US" sz="1500" dirty="0">
+                <a:solidFill>
+                  <a:schemeClr val="tx1">
+                    <a:lumMod val="65000"/>
+                    <a:lumOff val="35000"/>
+                  </a:schemeClr>
+                </a:solidFill>
+                <a:latin typeface="Aharoni" pitchFamily="2" charset="-79"/>
+                <a:cs typeface="Aharoni" pitchFamily="2" charset="-79"/>
+              </a:rPr>
+              <a:t>Requirements Gathering</a:t>
+            </a:r>
+          </a:p>
+        </p:txBody>
+      </p:sp>
+      <p:cxnSp>
+        <p:nvCxnSpPr>
+          <p:cNvPr id="7" name="Straight Arrow Connector 6"/>
+          <p:cNvCxnSpPr>
+            <a:stCxn id="5" idx="3"/>
+            <a:endCxn id="8" idx="1"/>
+          </p:cNvCxnSpPr>
+          <p:nvPr/>
+        </p:nvCxnSpPr>
+        <p:spPr>
+          <a:xfrm flipV="1">
+            <a:off x="3347864" y="3114806"/>
+            <a:ext cx="720080" cy="8359"/>
+          </a:xfrm>
+          <a:prstGeom prst="straightConnector1">
+            <a:avLst/>
+          </a:prstGeom>
+          <a:ln w="28575">
+            <a:solidFill>
+              <a:schemeClr val="tx1">
+                <a:lumMod val="50000"/>
+                <a:lumOff val="50000"/>
+              </a:schemeClr>
+            </a:solidFill>
+            <a:tailEnd type="stealth" w="lg" len="lg"/>
+          </a:ln>
+        </p:spPr>
+        <p:style>
+          <a:lnRef idx="1">
+            <a:schemeClr val="accent5"/>
+          </a:lnRef>
+          <a:fillRef idx="3">
+            <a:schemeClr val="accent5"/>
+          </a:fillRef>
+          <a:effectRef idx="2">
+            <a:schemeClr val="accent5"/>
+          </a:effectRef>
+          <a:fontRef idx="minor">
+            <a:schemeClr val="lt1"/>
+          </a:fontRef>
+        </p:style>
+      </p:cxnSp>
+      <p:sp>
+        <p:nvSpPr>
+          <p:cNvPr id="8" name="Rectangle 7"/>
+          <p:cNvSpPr/>
+          <p:nvPr/>
+        </p:nvSpPr>
+        <p:spPr>
+          <a:xfrm>
+            <a:off x="4067944" y="2754766"/>
+            <a:ext cx="1584176" cy="720080"/>
+          </a:xfrm>
+          <a:prstGeom prst="rect">
+            <a:avLst/>
+          </a:prstGeom>
+          <a:noFill/>
+          <a:ln w="12700">
+            <a:solidFill>
+              <a:schemeClr val="tx1">
+                <a:lumMod val="50000"/>
+                <a:lumOff val="50000"/>
+              </a:schemeClr>
+            </a:solidFill>
+          </a:ln>
+        </p:spPr>
+        <p:style>
+          <a:lnRef idx="1">
+            <a:schemeClr val="accent5"/>
+          </a:lnRef>
+          <a:fillRef idx="3">
+            <a:schemeClr val="accent5"/>
+          </a:fillRef>
+          <a:effectRef idx="2">
+            <a:schemeClr val="accent5"/>
+          </a:effectRef>
+          <a:fontRef idx="minor">
+            <a:schemeClr val="lt1"/>
+          </a:fontRef>
+        </p:style>
+        <p:txBody>
+          <a:bodyPr rtlCol="0" anchor="ctr"/>
+          <a:lstStyle/>
+          <a:p>
+            <a:pPr algn="ctr"/>
+            <a:r>
+              <a:rPr lang="en-US" sz="1500" dirty="0">
+                <a:solidFill>
+                  <a:schemeClr val="tx1">
+                    <a:lumMod val="65000"/>
+                    <a:lumOff val="35000"/>
+                  </a:schemeClr>
+                </a:solidFill>
+                <a:latin typeface="Aharoni" pitchFamily="2" charset="-79"/>
+                <a:cs typeface="Aharoni" pitchFamily="2" charset="-79"/>
+              </a:rPr>
+              <a:t>Quick Design</a:t>
+            </a:r>
+          </a:p>
+        </p:txBody>
+      </p:sp>
+      <p:sp>
+        <p:nvSpPr>
+          <p:cNvPr id="9" name="Rectangle 8"/>
+          <p:cNvSpPr/>
+          <p:nvPr/>
+        </p:nvSpPr>
+        <p:spPr>
+          <a:xfrm>
+            <a:off x="6411069" y="2763125"/>
+            <a:ext cx="1584176" cy="720080"/>
+          </a:xfrm>
+          <a:prstGeom prst="rect">
+            <a:avLst/>
+          </a:prstGeom>
+          <a:noFill/>
+          <a:ln w="12700">
+            <a:solidFill>
+              <a:schemeClr val="tx1">
+                <a:lumMod val="50000"/>
+                <a:lumOff val="50000"/>
+              </a:schemeClr>
+            </a:solidFill>
+          </a:ln>
+        </p:spPr>
+        <p:style>
+          <a:lnRef idx="1">
+            <a:schemeClr val="accent5"/>
+          </a:lnRef>
+          <a:fillRef idx="3">
+            <a:schemeClr val="accent5"/>
+          </a:fillRef>
+          <a:effectRef idx="2">
+            <a:schemeClr val="accent5"/>
+          </a:effectRef>
+          <a:fontRef idx="minor">
+            <a:schemeClr val="lt1"/>
+          </a:fontRef>
+        </p:style>
+        <p:txBody>
+          <a:bodyPr rtlCol="0" anchor="ctr"/>
+          <a:lstStyle/>
+          <a:p>
+            <a:pPr algn="ctr"/>
+            <a:r>
+              <a:rPr lang="en-US" sz="1500" dirty="0">
+                <a:solidFill>
+                  <a:schemeClr val="tx1">
+                    <a:lumMod val="65000"/>
+                    <a:lumOff val="35000"/>
+                  </a:schemeClr>
+                </a:solidFill>
+                <a:latin typeface="Aharoni" pitchFamily="2" charset="-79"/>
+                <a:cs typeface="Aharoni" pitchFamily="2" charset="-79"/>
+              </a:rPr>
+              <a:t>Building Prototype</a:t>
+            </a:r>
+          </a:p>
+        </p:txBody>
+      </p:sp>
+      <p:sp>
+        <p:nvSpPr>
+          <p:cNvPr id="10" name="Rectangle 9"/>
+          <p:cNvSpPr/>
+          <p:nvPr/>
+        </p:nvSpPr>
+        <p:spPr>
+          <a:xfrm>
+            <a:off x="6411069" y="4275293"/>
+            <a:ext cx="1584176" cy="720080"/>
+          </a:xfrm>
+          <a:prstGeom prst="rect">
+            <a:avLst/>
+          </a:prstGeom>
+          <a:noFill/>
+          <a:ln w="12700">
+            <a:solidFill>
+              <a:schemeClr val="tx1">
+                <a:lumMod val="50000"/>
+                <a:lumOff val="50000"/>
+              </a:schemeClr>
+            </a:solidFill>
+          </a:ln>
+        </p:spPr>
+        <p:style>
+          <a:lnRef idx="1">
+            <a:schemeClr val="accent5"/>
+          </a:lnRef>
+          <a:fillRef idx="3">
+            <a:schemeClr val="accent5"/>
+          </a:fillRef>
+          <a:effectRef idx="2">
+            <a:schemeClr val="accent5"/>
+          </a:effectRef>
+          <a:fontRef idx="minor">
+            <a:schemeClr val="lt1"/>
+          </a:fontRef>
+        </p:style>
+        <p:txBody>
+          <a:bodyPr rtlCol="0" anchor="ctr"/>
+          <a:lstStyle/>
+          <a:p>
+            <a:pPr algn="ctr"/>
+            <a:r>
+              <a:rPr lang="en-US" sz="1500" dirty="0">
+                <a:solidFill>
+                  <a:schemeClr val="tx1">
+                    <a:lumMod val="65000"/>
+                    <a:lumOff val="35000"/>
+                  </a:schemeClr>
+                </a:solidFill>
+                <a:latin typeface="Aharoni" pitchFamily="2" charset="-79"/>
+                <a:cs typeface="Aharoni" pitchFamily="2" charset="-79"/>
+              </a:rPr>
+              <a:t>Customer Evaluation</a:t>
+            </a:r>
+          </a:p>
+        </p:txBody>
+      </p:sp>
+      <p:sp>
+        <p:nvSpPr>
+          <p:cNvPr id="11" name="Rectangle 10"/>
+          <p:cNvSpPr/>
+          <p:nvPr/>
+        </p:nvSpPr>
+        <p:spPr>
+          <a:xfrm>
+            <a:off x="4067944" y="4275293"/>
+            <a:ext cx="1584176" cy="720080"/>
+          </a:xfrm>
+          <a:prstGeom prst="rect">
+            <a:avLst/>
+          </a:prstGeom>
+          <a:noFill/>
+          <a:ln w="12700">
+            <a:solidFill>
+              <a:schemeClr val="tx1">
+                <a:lumMod val="50000"/>
+                <a:lumOff val="50000"/>
+              </a:schemeClr>
+            </a:solidFill>
+          </a:ln>
+        </p:spPr>
+        <p:style>
+          <a:lnRef idx="1">
+            <a:schemeClr val="accent5"/>
+          </a:lnRef>
+          <a:fillRef idx="3">
+            <a:schemeClr val="accent5"/>
+          </a:fillRef>
+          <a:effectRef idx="2">
+            <a:schemeClr val="accent5"/>
+          </a:effectRef>
+          <a:fontRef idx="minor">
+            <a:schemeClr val="lt1"/>
+          </a:fontRef>
+        </p:style>
+        <p:txBody>
+          <a:bodyPr rtlCol="0" anchor="ctr"/>
+          <a:lstStyle/>
+          <a:p>
+            <a:pPr algn="ctr"/>
+            <a:r>
+              <a:rPr lang="en-US" sz="1500" dirty="0">
+                <a:solidFill>
+                  <a:schemeClr val="tx1">
+                    <a:lumMod val="65000"/>
+                    <a:lumOff val="35000"/>
+                  </a:schemeClr>
+                </a:solidFill>
+                <a:latin typeface="Aharoni" pitchFamily="2" charset="-79"/>
+                <a:cs typeface="Aharoni" pitchFamily="2" charset="-79"/>
+              </a:rPr>
+              <a:t>Refining Prototype</a:t>
+            </a:r>
+          </a:p>
+        </p:txBody>
+      </p:sp>
+      <p:sp>
+        <p:nvSpPr>
+          <p:cNvPr id="12" name="Rectangle 11"/>
+          <p:cNvSpPr/>
+          <p:nvPr/>
+        </p:nvSpPr>
+        <p:spPr>
+          <a:xfrm>
+            <a:off x="1763688" y="4277203"/>
+            <a:ext cx="1584176" cy="720080"/>
+          </a:xfrm>
+          <a:prstGeom prst="rect">
+            <a:avLst/>
+          </a:prstGeom>
+          <a:noFill/>
+          <a:ln w="12700">
+            <a:solidFill>
+              <a:schemeClr val="tx1">
+                <a:lumMod val="50000"/>
+                <a:lumOff val="50000"/>
+              </a:schemeClr>
+            </a:solidFill>
+          </a:ln>
+        </p:spPr>
+        <p:style>
+          <a:lnRef idx="1">
+            <a:schemeClr val="accent5"/>
+          </a:lnRef>
+          <a:fillRef idx="3">
+            <a:schemeClr val="accent5"/>
+          </a:fillRef>
+          <a:effectRef idx="2">
+            <a:schemeClr val="accent5"/>
+          </a:effectRef>
+          <a:fontRef idx="minor">
+            <a:schemeClr val="lt1"/>
+          </a:fontRef>
+        </p:style>
+        <p:txBody>
+          <a:bodyPr rtlCol="0" anchor="ctr"/>
+          <a:lstStyle/>
+          <a:p>
+            <a:pPr algn="ctr"/>
+            <a:r>
+              <a:rPr lang="en-US" sz="1500" dirty="0" smtClean="0">
+                <a:solidFill>
+                  <a:schemeClr val="tx1">
+                    <a:lumMod val="65000"/>
+                    <a:lumOff val="35000"/>
+                  </a:schemeClr>
+                </a:solidFill>
+                <a:latin typeface="Aharoni" pitchFamily="2" charset="-79"/>
+                <a:cs typeface="Aharoni" pitchFamily="2" charset="-79"/>
+              </a:rPr>
+              <a:t>Product</a:t>
+            </a:r>
+          </a:p>
+          <a:p>
+            <a:pPr algn="ctr"/>
+            <a:r>
+              <a:rPr lang="en-US" sz="1500" dirty="0" smtClean="0">
+                <a:solidFill>
+                  <a:schemeClr val="tx1">
+                    <a:lumMod val="65000"/>
+                    <a:lumOff val="35000"/>
+                  </a:schemeClr>
+                </a:solidFill>
+                <a:latin typeface="Aharoni" pitchFamily="2" charset="-79"/>
+                <a:cs typeface="Aharoni" pitchFamily="2" charset="-79"/>
+              </a:rPr>
+              <a:t>Development</a:t>
+            </a:r>
+            <a:endParaRPr lang="ru-RU" sz="1500" dirty="0" smtClean="0">
+              <a:solidFill>
+                <a:schemeClr val="tx1">
+                  <a:lumMod val="65000"/>
+                  <a:lumOff val="35000"/>
+                </a:schemeClr>
+              </a:solidFill>
+              <a:latin typeface="Aharoni" pitchFamily="2" charset="-79"/>
+              <a:cs typeface="Aharoni" pitchFamily="2" charset="-79"/>
+            </a:endParaRPr>
+          </a:p>
+          <a:p>
+            <a:pPr algn="ctr"/>
+            <a:r>
+              <a:rPr lang="en-US" sz="1500" dirty="0" smtClean="0">
+                <a:solidFill>
+                  <a:schemeClr val="tx1">
+                    <a:lumMod val="65000"/>
+                    <a:lumOff val="35000"/>
+                  </a:schemeClr>
+                </a:solidFill>
+                <a:latin typeface="Aharoni" pitchFamily="2" charset="-79"/>
+                <a:cs typeface="Aharoni" pitchFamily="2" charset="-79"/>
+              </a:rPr>
+              <a:t>and Testing</a:t>
+            </a:r>
+            <a:endParaRPr lang="en-US" sz="1500" dirty="0">
+              <a:solidFill>
+                <a:schemeClr val="tx1">
+                  <a:lumMod val="65000"/>
+                  <a:lumOff val="35000"/>
+                </a:schemeClr>
+              </a:solidFill>
+              <a:latin typeface="Aharoni" pitchFamily="2" charset="-79"/>
+              <a:cs typeface="Aharoni" pitchFamily="2" charset="-79"/>
+            </a:endParaRPr>
+          </a:p>
+        </p:txBody>
+      </p:sp>
+      <p:cxnSp>
+        <p:nvCxnSpPr>
+          <p:cNvPr id="13" name="Straight Arrow Connector 12"/>
+          <p:cNvCxnSpPr>
+            <a:stCxn id="8" idx="3"/>
+            <a:endCxn id="9" idx="1"/>
+          </p:cNvCxnSpPr>
+          <p:nvPr/>
+        </p:nvCxnSpPr>
+        <p:spPr>
+          <a:xfrm>
+            <a:off x="5652120" y="3114806"/>
+            <a:ext cx="758949" cy="8359"/>
+          </a:xfrm>
+          <a:prstGeom prst="straightConnector1">
+            <a:avLst/>
+          </a:prstGeom>
+          <a:ln w="28575">
+            <a:solidFill>
+              <a:schemeClr val="tx1">
+                <a:lumMod val="50000"/>
+                <a:lumOff val="50000"/>
+              </a:schemeClr>
+            </a:solidFill>
+            <a:tailEnd type="stealth" w="lg" len="lg"/>
+          </a:ln>
+        </p:spPr>
+        <p:style>
+          <a:lnRef idx="1">
+            <a:schemeClr val="accent5"/>
+          </a:lnRef>
+          <a:fillRef idx="3">
+            <a:schemeClr val="accent5"/>
+          </a:fillRef>
+          <a:effectRef idx="2">
+            <a:schemeClr val="accent5"/>
+          </a:effectRef>
+          <a:fontRef idx="minor">
+            <a:schemeClr val="lt1"/>
+          </a:fontRef>
+        </p:style>
+      </p:cxnSp>
+      <p:cxnSp>
+        <p:nvCxnSpPr>
+          <p:cNvPr id="16" name="Straight Arrow Connector 15"/>
+          <p:cNvCxnSpPr>
+            <a:endCxn id="5" idx="1"/>
+          </p:cNvCxnSpPr>
+          <p:nvPr/>
+        </p:nvCxnSpPr>
+        <p:spPr>
+          <a:xfrm>
+            <a:off x="1043608" y="3123165"/>
+            <a:ext cx="720080" cy="0"/>
+          </a:xfrm>
+          <a:prstGeom prst="straightConnector1">
+            <a:avLst/>
+          </a:prstGeom>
+          <a:ln w="28575">
+            <a:solidFill>
+              <a:schemeClr val="tx1">
+                <a:lumMod val="50000"/>
+                <a:lumOff val="50000"/>
+              </a:schemeClr>
+            </a:solidFill>
+            <a:tailEnd type="stealth" w="lg" len="lg"/>
+          </a:ln>
+        </p:spPr>
+        <p:style>
+          <a:lnRef idx="1">
+            <a:schemeClr val="accent5"/>
+          </a:lnRef>
+          <a:fillRef idx="3">
+            <a:schemeClr val="accent5"/>
+          </a:fillRef>
+          <a:effectRef idx="2">
+            <a:schemeClr val="accent5"/>
+          </a:effectRef>
+          <a:fontRef idx="minor">
+            <a:schemeClr val="lt1"/>
+          </a:fontRef>
+        </p:style>
+      </p:cxnSp>
+      <p:cxnSp>
+        <p:nvCxnSpPr>
+          <p:cNvPr id="25" name="Straight Arrow Connector 24"/>
+          <p:cNvCxnSpPr>
+            <a:stCxn id="9" idx="2"/>
+            <a:endCxn id="10" idx="0"/>
+          </p:cNvCxnSpPr>
+          <p:nvPr/>
+        </p:nvCxnSpPr>
+        <p:spPr>
+          <a:xfrm>
+            <a:off x="7203157" y="3483205"/>
+            <a:ext cx="0" cy="792088"/>
+          </a:xfrm>
+          <a:prstGeom prst="straightConnector1">
+            <a:avLst/>
+          </a:prstGeom>
+          <a:ln w="28575">
+            <a:solidFill>
+              <a:schemeClr val="tx1">
+                <a:lumMod val="50000"/>
+                <a:lumOff val="50000"/>
+              </a:schemeClr>
+            </a:solidFill>
+            <a:tailEnd type="stealth" w="lg" len="lg"/>
+          </a:ln>
+        </p:spPr>
+        <p:style>
+          <a:lnRef idx="1">
+            <a:schemeClr val="accent5"/>
+          </a:lnRef>
+          <a:fillRef idx="3">
+            <a:schemeClr val="accent5"/>
+          </a:fillRef>
+          <a:effectRef idx="2">
+            <a:schemeClr val="accent5"/>
+          </a:effectRef>
+          <a:fontRef idx="minor">
+            <a:schemeClr val="lt1"/>
+          </a:fontRef>
+        </p:style>
+      </p:cxnSp>
+      <p:cxnSp>
+        <p:nvCxnSpPr>
+          <p:cNvPr id="30" name="Straight Arrow Connector 29"/>
+          <p:cNvCxnSpPr>
+            <a:stCxn id="10" idx="1"/>
+            <a:endCxn id="11" idx="3"/>
+          </p:cNvCxnSpPr>
+          <p:nvPr/>
+        </p:nvCxnSpPr>
+        <p:spPr>
+          <a:xfrm flipH="1">
+            <a:off x="5652120" y="4635333"/>
+            <a:ext cx="758949" cy="0"/>
+          </a:xfrm>
+          <a:prstGeom prst="straightConnector1">
+            <a:avLst/>
+          </a:prstGeom>
+          <a:ln w="28575">
+            <a:solidFill>
+              <a:schemeClr val="tx1">
+                <a:lumMod val="50000"/>
+                <a:lumOff val="50000"/>
+              </a:schemeClr>
+            </a:solidFill>
+            <a:tailEnd type="stealth" w="lg" len="lg"/>
+          </a:ln>
+        </p:spPr>
+        <p:style>
+          <a:lnRef idx="1">
+            <a:schemeClr val="accent5"/>
+          </a:lnRef>
+          <a:fillRef idx="3">
+            <a:schemeClr val="accent5"/>
+          </a:fillRef>
+          <a:effectRef idx="2">
+            <a:schemeClr val="accent5"/>
+          </a:effectRef>
+          <a:fontRef idx="minor">
+            <a:schemeClr val="lt1"/>
+          </a:fontRef>
+        </p:style>
+      </p:cxnSp>
+      <p:cxnSp>
+        <p:nvCxnSpPr>
+          <p:cNvPr id="36" name="Straight Arrow Connector 35"/>
+          <p:cNvCxnSpPr>
+            <a:stCxn id="11" idx="1"/>
+            <a:endCxn id="12" idx="3"/>
+          </p:cNvCxnSpPr>
+          <p:nvPr/>
+        </p:nvCxnSpPr>
+        <p:spPr>
+          <a:xfrm flipH="1">
+            <a:off x="3347864" y="4635333"/>
+            <a:ext cx="720080" cy="1910"/>
+          </a:xfrm>
+          <a:prstGeom prst="straightConnector1">
+            <a:avLst/>
+          </a:prstGeom>
+          <a:ln w="28575">
+            <a:solidFill>
+              <a:schemeClr val="tx1">
+                <a:lumMod val="50000"/>
+                <a:lumOff val="50000"/>
+              </a:schemeClr>
+            </a:solidFill>
+            <a:tailEnd type="stealth" w="lg" len="lg"/>
+          </a:ln>
+        </p:spPr>
+        <p:style>
+          <a:lnRef idx="1">
+            <a:schemeClr val="accent5"/>
+          </a:lnRef>
+          <a:fillRef idx="3">
+            <a:schemeClr val="accent5"/>
+          </a:fillRef>
+          <a:effectRef idx="2">
+            <a:schemeClr val="accent5"/>
+          </a:effectRef>
+          <a:fontRef idx="minor">
+            <a:schemeClr val="lt1"/>
+          </a:fontRef>
+        </p:style>
+      </p:cxnSp>
+      <p:cxnSp>
+        <p:nvCxnSpPr>
+          <p:cNvPr id="43" name="Straight Arrow Connector 42"/>
+          <p:cNvCxnSpPr>
+            <a:stCxn id="12" idx="1"/>
+          </p:cNvCxnSpPr>
+          <p:nvPr/>
+        </p:nvCxnSpPr>
+        <p:spPr>
+          <a:xfrm flipH="1">
+            <a:off x="971600" y="4637243"/>
+            <a:ext cx="792088" cy="372"/>
+          </a:xfrm>
+          <a:prstGeom prst="straightConnector1">
+            <a:avLst/>
+          </a:prstGeom>
+          <a:ln w="28575">
+            <a:solidFill>
+              <a:schemeClr val="tx1">
+                <a:lumMod val="50000"/>
+                <a:lumOff val="50000"/>
+              </a:schemeClr>
+            </a:solidFill>
+            <a:tailEnd type="stealth" w="lg" len="lg"/>
+          </a:ln>
+        </p:spPr>
+        <p:style>
+          <a:lnRef idx="1">
+            <a:schemeClr val="accent5"/>
+          </a:lnRef>
+          <a:fillRef idx="3">
+            <a:schemeClr val="accent5"/>
+          </a:fillRef>
+          <a:effectRef idx="2">
+            <a:schemeClr val="accent5"/>
+          </a:effectRef>
+          <a:fontRef idx="minor">
+            <a:schemeClr val="lt1"/>
+          </a:fontRef>
+        </p:style>
+      </p:cxnSp>
+      <p:cxnSp>
+        <p:nvCxnSpPr>
+          <p:cNvPr id="48" name="Straight Arrow Connector 47"/>
+          <p:cNvCxnSpPr>
+            <a:stCxn id="11" idx="0"/>
+            <a:endCxn id="8" idx="2"/>
+          </p:cNvCxnSpPr>
+          <p:nvPr/>
+        </p:nvCxnSpPr>
+        <p:spPr>
+          <a:xfrm flipV="1">
+            <a:off x="4860032" y="3474846"/>
+            <a:ext cx="0" cy="800447"/>
+          </a:xfrm>
+          <a:prstGeom prst="straightConnector1">
+            <a:avLst/>
+          </a:prstGeom>
+          <a:ln w="28575">
+            <a:solidFill>
+              <a:schemeClr val="tx1">
+                <a:lumMod val="50000"/>
+                <a:lumOff val="50000"/>
+              </a:schemeClr>
+            </a:solidFill>
+            <a:tailEnd type="stealth" w="lg" len="lg"/>
+          </a:ln>
+        </p:spPr>
+        <p:style>
+          <a:lnRef idx="1">
+            <a:schemeClr val="accent5"/>
+          </a:lnRef>
+          <a:fillRef idx="3">
+            <a:schemeClr val="accent5"/>
+          </a:fillRef>
+          <a:effectRef idx="2">
+            <a:schemeClr val="accent5"/>
+          </a:effectRef>
+          <a:fontRef idx="minor">
+            <a:schemeClr val="lt1"/>
+          </a:fontRef>
+        </p:style>
+      </p:cxnSp>
+      <p:sp>
+        <p:nvSpPr>
+          <p:cNvPr id="17" name="TextBox 16"/>
           <p:cNvSpPr txBox="1"/>
           <p:nvPr/>
         </p:nvSpPr>
         <p:spPr>
           <a:xfrm>
-            <a:off x="596955" y="404664"/>
-            <a:ext cx="8326062" cy="584775"/>
+            <a:off x="3540741" y="348944"/>
+            <a:ext cx="2257348" cy="584775"/>
           </a:xfrm>
           <a:prstGeom prst="rect">
             <a:avLst/>
@@ -3650,8 +4590,9 @@
           </a:bodyPr>
           <a:lstStyle/>
           <a:p>
-            <a:r>
-              <a:rPr lang="ru-RU" sz="3200" dirty="0" smtClean="0">
+            <a:pPr algn="ctr"/>
+            <a:r>
+              <a:rPr lang="en-US" sz="3200" dirty="0" smtClean="0">
                 <a:solidFill>
                   <a:schemeClr val="tx1">
                     <a:lumMod val="65000"/>
@@ -3661,7 +4602,7 @@
                 <a:latin typeface="Arial" panose="020B0604020202020204" pitchFamily="34" charset="0"/>
                 <a:cs typeface="Arial" panose="020B0604020202020204" pitchFamily="34" charset="0"/>
               </a:rPr>
-              <a:t>Традиционные подходы к разработке ПО</a:t>
+              <a:t>Prototyping</a:t>
             </a:r>
             <a:endParaRPr lang="en-US" sz="3000" dirty="0">
               <a:solidFill>
@@ -3683,14 +4624,14 @@
       </p:sp>
       <p:sp>
         <p:nvSpPr>
-          <p:cNvPr id="8" name="Rectangle 7"/>
+          <p:cNvPr id="2" name="Rectangle 1"/>
           <p:cNvSpPr/>
           <p:nvPr/>
         </p:nvSpPr>
         <p:spPr>
           <a:xfrm>
-            <a:off x="596955" y="1196752"/>
-            <a:ext cx="7560840" cy="4832092"/>
+            <a:off x="755576" y="1292752"/>
+            <a:ext cx="7887741" cy="646331"/>
           </a:xfrm>
           <a:prstGeom prst="rect">
             <a:avLst/>
@@ -3702,143 +4643,13 @@
           </a:bodyPr>
           <a:lstStyle/>
           <a:p>
-            <a:pPr marL="285750" lvl="0" indent="-285750">
-              <a:buClr>
-                <a:schemeClr val="accent2"/>
-              </a:buClr>
-              <a:buFont typeface="Wingdings" pitchFamily="2" charset="2"/>
-              <a:buChar char="Ø"/>
-            </a:pPr>
-            <a:r>
-              <a:rPr lang="ru-RU" sz="2200" b="1" dirty="0"/>
-              <a:t>Сильные </a:t>
-            </a:r>
-            <a:r>
-              <a:rPr lang="ru-RU" sz="2200" b="1" dirty="0" smtClean="0"/>
-              <a:t>стороны</a:t>
-            </a:r>
-          </a:p>
-          <a:p>
-            <a:pPr marL="742950" lvl="1" indent="-285750">
-              <a:buClr>
-                <a:schemeClr val="accent2"/>
-              </a:buClr>
-              <a:buFont typeface="Wingdings" pitchFamily="2" charset="2"/>
-              <a:buChar char="Ø"/>
-            </a:pPr>
-            <a:endParaRPr lang="ru-RU" sz="2200" i="1" dirty="0" smtClean="0"/>
-          </a:p>
-          <a:p>
-            <a:pPr marL="742950" lvl="1" indent="-285750">
-              <a:buClr>
-                <a:schemeClr val="accent2"/>
-              </a:buClr>
-              <a:buFont typeface="Wingdings" pitchFamily="2" charset="2"/>
-              <a:buChar char="Ø"/>
-            </a:pPr>
-            <a:r>
-              <a:rPr lang="ru-RU" sz="2200" i="1" dirty="0" smtClean="0"/>
-              <a:t>Модели </a:t>
-            </a:r>
-            <a:r>
-              <a:rPr lang="ru-RU" sz="2200" i="1" dirty="0"/>
-              <a:t>легко-понятны, </a:t>
-            </a:r>
-            <a:r>
-              <a:rPr lang="ru-RU" sz="2200" i="1" dirty="0" smtClean="0"/>
-              <a:t>легко-применимы, легко-осуществимы</a:t>
-            </a:r>
-          </a:p>
-          <a:p>
-            <a:pPr marL="742950" lvl="1" indent="-285750">
-              <a:buClr>
-                <a:schemeClr val="accent2"/>
-              </a:buClr>
-              <a:buFont typeface="Wingdings" pitchFamily="2" charset="2"/>
-              <a:buChar char="Ø"/>
-            </a:pPr>
-            <a:endParaRPr lang="ru-RU" sz="2200" i="1" dirty="0"/>
-          </a:p>
-          <a:p>
-            <a:pPr marL="742950" lvl="1" indent="-285750">
-              <a:buClr>
-                <a:schemeClr val="accent2"/>
-              </a:buClr>
-              <a:buFont typeface="Wingdings" pitchFamily="2" charset="2"/>
-              <a:buChar char="Ø"/>
-            </a:pPr>
-            <a:r>
-              <a:rPr lang="ru-RU" sz="2200" i="1" dirty="0" smtClean="0"/>
-              <a:t>Могут легко применяться для сотрудников невысокой квалификации</a:t>
-            </a:r>
-          </a:p>
-          <a:p>
-            <a:pPr marL="742950" lvl="1" indent="-285750">
-              <a:buClr>
-                <a:schemeClr val="accent2"/>
-              </a:buClr>
-              <a:buFont typeface="Wingdings" pitchFamily="2" charset="2"/>
-              <a:buChar char="Ø"/>
-            </a:pPr>
-            <a:endParaRPr lang="ru-RU" sz="2200" i="1" dirty="0"/>
-          </a:p>
-          <a:p>
-            <a:pPr marL="742950" lvl="1" indent="-285750">
-              <a:buClr>
-                <a:schemeClr val="accent2"/>
-              </a:buClr>
-              <a:buFont typeface="Wingdings" pitchFamily="2" charset="2"/>
-              <a:buChar char="Ø"/>
-            </a:pPr>
-            <a:r>
-              <a:rPr lang="ru-RU" sz="2200" i="1" dirty="0" smtClean="0"/>
-              <a:t>Определяют чёткие требования к продукту</a:t>
-            </a:r>
-          </a:p>
-          <a:p>
-            <a:pPr marL="742950" lvl="1" indent="-285750">
-              <a:buClr>
-                <a:schemeClr val="accent2"/>
-              </a:buClr>
-              <a:buFont typeface="Wingdings" pitchFamily="2" charset="2"/>
-              <a:buChar char="Ø"/>
-            </a:pPr>
-            <a:endParaRPr lang="ru-RU" sz="2200" i="1" dirty="0"/>
-          </a:p>
-          <a:p>
-            <a:pPr marL="742950" lvl="1" indent="-285750">
-              <a:buClr>
-                <a:schemeClr val="accent2"/>
-              </a:buClr>
-              <a:buFont typeface="Wingdings" pitchFamily="2" charset="2"/>
-              <a:buChar char="Ø"/>
-            </a:pPr>
-            <a:r>
-              <a:rPr lang="ru-RU" sz="2200" i="1" dirty="0" smtClean="0"/>
-              <a:t>Относительная легкость управления процессом</a:t>
-            </a:r>
-          </a:p>
-          <a:p>
-            <a:pPr marL="742950" lvl="1" indent="-285750">
-              <a:buClr>
-                <a:schemeClr val="accent2"/>
-              </a:buClr>
-              <a:buFont typeface="Wingdings" pitchFamily="2" charset="2"/>
-              <a:buChar char="Ø"/>
-            </a:pPr>
-            <a:endParaRPr lang="ru-RU" sz="2200" i="1" dirty="0"/>
-          </a:p>
-          <a:p>
-            <a:pPr marL="742950" lvl="1" indent="-285750">
-              <a:buClr>
-                <a:schemeClr val="accent2"/>
-              </a:buClr>
-              <a:buFont typeface="Wingdings" pitchFamily="2" charset="2"/>
-              <a:buChar char="Ø"/>
-            </a:pPr>
-            <a:r>
-              <a:rPr lang="ru-RU" sz="2200" i="1" dirty="0" smtClean="0"/>
-              <a:t>Отлично работают, когда качество более важно, чем стоимость или сроки разработки</a:t>
+            <a:r>
+              <a:rPr lang="en-US" dirty="0" smtClean="0"/>
+              <a:t>Instead </a:t>
+            </a:r>
+            <a:r>
+              <a:rPr lang="en-US" dirty="0"/>
+              <a:t>of freezing the requirements before a design or coding can proceed, a throwaway prototype is built to understand the requirements.</a:t>
             </a:r>
           </a:p>
         </p:txBody>
@@ -3846,7 +4657,7 @@
     </p:spTree>
     <p:extLst>
       <p:ext uri="{BB962C8B-B14F-4D97-AF65-F5344CB8AC3E}">
-        <p14:creationId xmlns:p14="http://schemas.microsoft.com/office/powerpoint/2010/main" val="1455751151"/>
+        <p14:creationId xmlns:p14="http://schemas.microsoft.com/office/powerpoint/2010/main" val="802213652"/>
       </p:ext>
     </p:extLst>
   </p:cSld>
@@ -3863,7 +4674,237 @@
 </p:sld>
 </file>
 
-<file path=ppt/slides/slide11.xml><?xml version="1.0" encoding="utf-8"?>
+<file path=ppt/slides/slide12.xml><?xml version="1.0" encoding="utf-8"?>
+<p:sld xmlns:a="http://schemas.openxmlformats.org/drawingml/2006/main" xmlns:r="http://schemas.openxmlformats.org/officeDocument/2006/relationships" xmlns:p="http://schemas.openxmlformats.org/presentationml/2006/main">
+  <p:cSld>
+    <p:spTree>
+      <p:nvGrpSpPr>
+        <p:cNvPr id="1" name=""/>
+        <p:cNvGrpSpPr/>
+        <p:nvPr/>
+      </p:nvGrpSpPr>
+      <p:grpSpPr>
+        <a:xfrm>
+          <a:off x="0" y="0"/>
+          <a:ext cx="0" cy="0"/>
+          <a:chOff x="0" y="0"/>
+          <a:chExt cx="0" cy="0"/>
+        </a:xfrm>
+      </p:grpSpPr>
+      <p:sp>
+        <p:nvSpPr>
+          <p:cNvPr id="3" name="Content Placeholder 2"/>
+          <p:cNvSpPr>
+            <a:spLocks noGrp="1"/>
+          </p:cNvSpPr>
+          <p:nvPr>
+            <p:ph idx="1"/>
+          </p:nvPr>
+        </p:nvSpPr>
+        <p:spPr>
+          <a:xfrm>
+            <a:off x="457200" y="933720"/>
+            <a:ext cx="8229600" cy="5192444"/>
+          </a:xfrm>
+        </p:spPr>
+        <p:txBody>
+          <a:bodyPr>
+            <a:normAutofit fontScale="62500" lnSpcReduction="20000"/>
+          </a:bodyPr>
+          <a:lstStyle/>
+          <a:p>
+            <a:pPr marL="0" indent="0">
+              <a:buNone/>
+            </a:pPr>
+            <a:r>
+              <a:rPr lang="en-US" b="1" dirty="0" smtClean="0"/>
+              <a:t>Advantages </a:t>
+            </a:r>
+            <a:r>
+              <a:rPr lang="en-US" b="1" dirty="0"/>
+              <a:t>of Prototype model:</a:t>
+            </a:r>
+            <a:endParaRPr lang="en-US" dirty="0"/>
+          </a:p>
+          <a:p>
+            <a:r>
+              <a:rPr lang="en-US" dirty="0"/>
+              <a:t>Users are actively involved in the development</a:t>
+            </a:r>
+          </a:p>
+          <a:p>
+            <a:r>
+              <a:rPr lang="en-US" dirty="0"/>
+              <a:t>Since in this methodology a working model of the system is provided, the users get a better understanding of the system being developed.</a:t>
+            </a:r>
+          </a:p>
+          <a:p>
+            <a:r>
+              <a:rPr lang="en-US" dirty="0"/>
+              <a:t>Errors can be detected much earlier.</a:t>
+            </a:r>
+          </a:p>
+          <a:p>
+            <a:r>
+              <a:rPr lang="en-US" dirty="0"/>
+              <a:t>Quicker user feedback is available leading to better solutions.</a:t>
+            </a:r>
+          </a:p>
+          <a:p>
+            <a:r>
+              <a:rPr lang="en-US" dirty="0"/>
+              <a:t>Missing functionality can be identified easily</a:t>
+            </a:r>
+          </a:p>
+          <a:p>
+            <a:r>
+              <a:rPr lang="en-US" dirty="0"/>
+              <a:t>Confusing or difficult functions can be identified</a:t>
+            </a:r>
+            <a:br>
+              <a:rPr lang="en-US" dirty="0"/>
+            </a:br>
+            <a:r>
+              <a:rPr lang="en-US" dirty="0"/>
+              <a:t>Requirements validation, Quick implementation of, incomplete, but</a:t>
+            </a:r>
+            <a:br>
+              <a:rPr lang="en-US" dirty="0"/>
+            </a:br>
+            <a:r>
+              <a:rPr lang="en-US" dirty="0"/>
+              <a:t>functional, </a:t>
+            </a:r>
+            <a:r>
+              <a:rPr lang="en-US" dirty="0" smtClean="0"/>
+              <a:t>application.</a:t>
+            </a:r>
+          </a:p>
+          <a:p>
+            <a:pPr marL="0" indent="0">
+              <a:buNone/>
+            </a:pPr>
+            <a:endParaRPr lang="en-US" b="1" dirty="0"/>
+          </a:p>
+          <a:p>
+            <a:pPr marL="0" indent="0">
+              <a:buNone/>
+            </a:pPr>
+            <a:r>
+              <a:rPr lang="en-US" b="1" dirty="0" smtClean="0"/>
+              <a:t>Disadvantages </a:t>
+            </a:r>
+            <a:r>
+              <a:rPr lang="en-US" b="1" dirty="0"/>
+              <a:t>of Prototype model:</a:t>
+            </a:r>
+            <a:endParaRPr lang="en-US" dirty="0"/>
+          </a:p>
+          <a:p>
+            <a:r>
+              <a:rPr lang="en-US" dirty="0"/>
+              <a:t>Leads to implementing and then repairing way of building systems.</a:t>
+            </a:r>
+          </a:p>
+          <a:p>
+            <a:r>
+              <a:rPr lang="en-US" dirty="0"/>
+              <a:t>Practically, this methodology may increase the complexity of the system as scope of the system may expand beyond original plans.</a:t>
+            </a:r>
+          </a:p>
+          <a:p>
+            <a:r>
+              <a:rPr lang="en-US" dirty="0"/>
+              <a:t>Incomplete application may cause application not to be used as the</a:t>
+            </a:r>
+            <a:br>
+              <a:rPr lang="en-US" dirty="0"/>
+            </a:br>
+            <a:r>
+              <a:rPr lang="en-US" dirty="0"/>
+              <a:t>full system was designed</a:t>
+            </a:r>
+            <a:br>
+              <a:rPr lang="en-US" dirty="0"/>
+            </a:br>
+            <a:r>
+              <a:rPr lang="en-US" dirty="0"/>
+              <a:t>Incomplete or inadequate problem analysis. </a:t>
+            </a:r>
+          </a:p>
+          <a:p>
+            <a:endParaRPr lang="en-US" dirty="0"/>
+          </a:p>
+        </p:txBody>
+      </p:sp>
+      <p:sp>
+        <p:nvSpPr>
+          <p:cNvPr id="4" name="TextBox 3"/>
+          <p:cNvSpPr txBox="1"/>
+          <p:nvPr/>
+        </p:nvSpPr>
+        <p:spPr>
+          <a:xfrm>
+            <a:off x="3540741" y="348944"/>
+            <a:ext cx="2257348" cy="584775"/>
+          </a:xfrm>
+          <a:prstGeom prst="rect">
+            <a:avLst/>
+          </a:prstGeom>
+          <a:noFill/>
+        </p:spPr>
+        <p:txBody>
+          <a:bodyPr wrap="none" rtlCol="0">
+            <a:spAutoFit/>
+          </a:bodyPr>
+          <a:lstStyle/>
+          <a:p>
+            <a:pPr algn="ctr"/>
+            <a:r>
+              <a:rPr lang="en-US" sz="3200" dirty="0" smtClean="0">
+                <a:solidFill>
+                  <a:schemeClr val="tx1">
+                    <a:lumMod val="65000"/>
+                    <a:lumOff val="35000"/>
+                  </a:schemeClr>
+                </a:solidFill>
+                <a:latin typeface="Arial" panose="020B0604020202020204" pitchFamily="34" charset="0"/>
+                <a:cs typeface="Arial" panose="020B0604020202020204" pitchFamily="34" charset="0"/>
+              </a:rPr>
+              <a:t>Prototyping</a:t>
+            </a:r>
+            <a:endParaRPr lang="en-US" sz="3000" dirty="0">
+              <a:solidFill>
+                <a:schemeClr val="tx1">
+                  <a:lumMod val="65000"/>
+                  <a:lumOff val="35000"/>
+                </a:schemeClr>
+              </a:solidFill>
+              <a:effectLst>
+                <a:outerShdw blurRad="38100" dist="38100" dir="2700000" algn="tl">
+                  <a:srgbClr val="000000">
+                    <a:alpha val="43137"/>
+                  </a:srgbClr>
+                </a:outerShdw>
+              </a:effectLst>
+            </a:endParaRPr>
+          </a:p>
+        </p:txBody>
+      </p:sp>
+    </p:spTree>
+    <p:extLst>
+      <p:ext uri="{BB962C8B-B14F-4D97-AF65-F5344CB8AC3E}">
+        <p14:creationId xmlns:p14="http://schemas.microsoft.com/office/powerpoint/2010/main" val="3233205059"/>
+      </p:ext>
+    </p:extLst>
+  </p:cSld>
+  <p:clrMapOvr>
+    <a:masterClrMapping/>
+  </p:clrMapOvr>
+</p:sld>
+</file>
+
+<file path=ppt/slides/slide13.xml><?xml version="1.0" encoding="utf-8"?>
 <p:sld xmlns:a="http://schemas.openxmlformats.org/drawingml/2006/main" xmlns:r="http://schemas.openxmlformats.org/officeDocument/2006/relationships" xmlns:p="http://schemas.openxmlformats.org/presentationml/2006/main">
   <p:cSld>
     <p:spTree>
@@ -4089,7 +5130,259 @@
 </p:sld>
 </file>
 
-<file path=ppt/slides/slide12.xml><?xml version="1.0" encoding="utf-8"?>
+<file path=ppt/slides/slide14.xml><?xml version="1.0" encoding="utf-8"?>
+<p:sld xmlns:a="http://schemas.openxmlformats.org/drawingml/2006/main" xmlns:r="http://schemas.openxmlformats.org/officeDocument/2006/relationships" xmlns:p="http://schemas.openxmlformats.org/presentationml/2006/main">
+  <p:cSld>
+    <p:spTree>
+      <p:nvGrpSpPr>
+        <p:cNvPr id="1" name=""/>
+        <p:cNvGrpSpPr/>
+        <p:nvPr/>
+      </p:nvGrpSpPr>
+      <p:grpSpPr>
+        <a:xfrm>
+          <a:off x="0" y="0"/>
+          <a:ext cx="0" cy="0"/>
+          <a:chOff x="0" y="0"/>
+          <a:chExt cx="0" cy="0"/>
+        </a:xfrm>
+      </p:grpSpPr>
+      <p:sp>
+        <p:nvSpPr>
+          <p:cNvPr id="4" name="TextBox 3"/>
+          <p:cNvSpPr txBox="1"/>
+          <p:nvPr/>
+        </p:nvSpPr>
+        <p:spPr>
+          <a:xfrm>
+            <a:off x="596955" y="404664"/>
+            <a:ext cx="8326062" cy="584775"/>
+          </a:xfrm>
+          <a:prstGeom prst="rect">
+            <a:avLst/>
+          </a:prstGeom>
+          <a:noFill/>
+        </p:spPr>
+        <p:txBody>
+          <a:bodyPr wrap="none" rtlCol="0">
+            <a:spAutoFit/>
+          </a:bodyPr>
+          <a:lstStyle/>
+          <a:p>
+            <a:r>
+              <a:rPr lang="ru-RU" sz="3200" dirty="0" smtClean="0">
+                <a:solidFill>
+                  <a:schemeClr val="tx1">
+                    <a:lumMod val="65000"/>
+                    <a:lumOff val="35000"/>
+                  </a:schemeClr>
+                </a:solidFill>
+                <a:latin typeface="Arial" panose="020B0604020202020204" pitchFamily="34" charset="0"/>
+                <a:cs typeface="Arial" panose="020B0604020202020204" pitchFamily="34" charset="0"/>
+              </a:rPr>
+              <a:t>Традиционные подходы к разработке ПО</a:t>
+            </a:r>
+            <a:endParaRPr lang="en-US" sz="3000" dirty="0">
+              <a:solidFill>
+                <a:schemeClr val="tx1">
+                  <a:lumMod val="65000"/>
+                  <a:lumOff val="35000"/>
+                </a:schemeClr>
+              </a:solidFill>
+              <a:effectLst>
+                <a:outerShdw blurRad="38100" dist="38100" dir="2700000" algn="tl">
+                  <a:srgbClr val="000000">
+                    <a:alpha val="43137"/>
+                  </a:srgbClr>
+                </a:outerShdw>
+              </a:effectLst>
+            </a:endParaRPr>
+          </a:p>
+        </p:txBody>
+      </p:sp>
+      <p:sp>
+        <p:nvSpPr>
+          <p:cNvPr id="8" name="Rectangle 7"/>
+          <p:cNvSpPr/>
+          <p:nvPr/>
+        </p:nvSpPr>
+        <p:spPr>
+          <a:xfrm>
+            <a:off x="596955" y="1196752"/>
+            <a:ext cx="7560840" cy="4832092"/>
+          </a:xfrm>
+          <a:prstGeom prst="rect">
+            <a:avLst/>
+          </a:prstGeom>
+        </p:spPr>
+        <p:txBody>
+          <a:bodyPr wrap="square">
+            <a:spAutoFit/>
+          </a:bodyPr>
+          <a:lstStyle/>
+          <a:p>
+            <a:pPr marL="285750" lvl="0" indent="-285750">
+              <a:buClr>
+                <a:schemeClr val="accent2"/>
+              </a:buClr>
+              <a:buFont typeface="Wingdings" pitchFamily="2" charset="2"/>
+              <a:buChar char="Ø"/>
+            </a:pPr>
+            <a:r>
+              <a:rPr lang="ru-RU" sz="2200" b="1" dirty="0"/>
+              <a:t>Сильные </a:t>
+            </a:r>
+            <a:r>
+              <a:rPr lang="ru-RU" sz="2200" b="1" dirty="0" smtClean="0"/>
+              <a:t>стороны</a:t>
+            </a:r>
+          </a:p>
+          <a:p>
+            <a:pPr marL="742950" lvl="1" indent="-285750">
+              <a:buClr>
+                <a:schemeClr val="accent2"/>
+              </a:buClr>
+              <a:buFont typeface="Wingdings" pitchFamily="2" charset="2"/>
+              <a:buChar char="Ø"/>
+            </a:pPr>
+            <a:endParaRPr lang="ru-RU" sz="2200" i="1" dirty="0" smtClean="0"/>
+          </a:p>
+          <a:p>
+            <a:pPr marL="742950" lvl="1" indent="-285750">
+              <a:buClr>
+                <a:schemeClr val="accent2"/>
+              </a:buClr>
+              <a:buFont typeface="Wingdings" pitchFamily="2" charset="2"/>
+              <a:buChar char="Ø"/>
+            </a:pPr>
+            <a:r>
+              <a:rPr lang="ru-RU" sz="2200" i="1" dirty="0" smtClean="0"/>
+              <a:t>Модели </a:t>
+            </a:r>
+            <a:r>
+              <a:rPr lang="ru-RU" sz="2200" i="1" dirty="0"/>
+              <a:t>легко-понятны, </a:t>
+            </a:r>
+            <a:r>
+              <a:rPr lang="ru-RU" sz="2200" i="1" dirty="0" smtClean="0"/>
+              <a:t>легко-применимы, легко-осуществимы</a:t>
+            </a:r>
+          </a:p>
+          <a:p>
+            <a:pPr marL="742950" lvl="1" indent="-285750">
+              <a:buClr>
+                <a:schemeClr val="accent2"/>
+              </a:buClr>
+              <a:buFont typeface="Wingdings" pitchFamily="2" charset="2"/>
+              <a:buChar char="Ø"/>
+            </a:pPr>
+            <a:endParaRPr lang="ru-RU" sz="2200" i="1" dirty="0"/>
+          </a:p>
+          <a:p>
+            <a:pPr marL="742950" lvl="1" indent="-285750">
+              <a:buClr>
+                <a:schemeClr val="accent2"/>
+              </a:buClr>
+              <a:buFont typeface="Wingdings" pitchFamily="2" charset="2"/>
+              <a:buChar char="Ø"/>
+            </a:pPr>
+            <a:r>
+              <a:rPr lang="ru-RU" sz="2200" i="1" dirty="0" smtClean="0"/>
+              <a:t>Могут легко применяться для сотрудников невысокой квалификации</a:t>
+            </a:r>
+          </a:p>
+          <a:p>
+            <a:pPr marL="742950" lvl="1" indent="-285750">
+              <a:buClr>
+                <a:schemeClr val="accent2"/>
+              </a:buClr>
+              <a:buFont typeface="Wingdings" pitchFamily="2" charset="2"/>
+              <a:buChar char="Ø"/>
+            </a:pPr>
+            <a:endParaRPr lang="ru-RU" sz="2200" i="1" dirty="0"/>
+          </a:p>
+          <a:p>
+            <a:pPr marL="742950" lvl="1" indent="-285750">
+              <a:buClr>
+                <a:schemeClr val="accent2"/>
+              </a:buClr>
+              <a:buFont typeface="Wingdings" pitchFamily="2" charset="2"/>
+              <a:buChar char="Ø"/>
+            </a:pPr>
+            <a:r>
+              <a:rPr lang="ru-RU" sz="2200" i="1" dirty="0" smtClean="0"/>
+              <a:t>Определяют чёткие требования к продукту</a:t>
+            </a:r>
+          </a:p>
+          <a:p>
+            <a:pPr marL="742950" lvl="1" indent="-285750">
+              <a:buClr>
+                <a:schemeClr val="accent2"/>
+              </a:buClr>
+              <a:buFont typeface="Wingdings" pitchFamily="2" charset="2"/>
+              <a:buChar char="Ø"/>
+            </a:pPr>
+            <a:endParaRPr lang="ru-RU" sz="2200" i="1" dirty="0"/>
+          </a:p>
+          <a:p>
+            <a:pPr marL="742950" lvl="1" indent="-285750">
+              <a:buClr>
+                <a:schemeClr val="accent2"/>
+              </a:buClr>
+              <a:buFont typeface="Wingdings" pitchFamily="2" charset="2"/>
+              <a:buChar char="Ø"/>
+            </a:pPr>
+            <a:r>
+              <a:rPr lang="ru-RU" sz="2200" i="1" dirty="0" smtClean="0"/>
+              <a:t>Относительная легкость управления процессом</a:t>
+            </a:r>
+          </a:p>
+          <a:p>
+            <a:pPr marL="742950" lvl="1" indent="-285750">
+              <a:buClr>
+                <a:schemeClr val="accent2"/>
+              </a:buClr>
+              <a:buFont typeface="Wingdings" pitchFamily="2" charset="2"/>
+              <a:buChar char="Ø"/>
+            </a:pPr>
+            <a:endParaRPr lang="ru-RU" sz="2200" i="1" dirty="0"/>
+          </a:p>
+          <a:p>
+            <a:pPr marL="742950" lvl="1" indent="-285750">
+              <a:buClr>
+                <a:schemeClr val="accent2"/>
+              </a:buClr>
+              <a:buFont typeface="Wingdings" pitchFamily="2" charset="2"/>
+              <a:buChar char="Ø"/>
+            </a:pPr>
+            <a:r>
+              <a:rPr lang="ru-RU" sz="2200" i="1" dirty="0" smtClean="0"/>
+              <a:t>Отлично работают, когда качество более важно, чем стоимость или сроки разработки</a:t>
+            </a:r>
+          </a:p>
+        </p:txBody>
+      </p:sp>
+    </p:spTree>
+    <p:extLst>
+      <p:ext uri="{BB962C8B-B14F-4D97-AF65-F5344CB8AC3E}">
+        <p14:creationId xmlns:p14="http://schemas.microsoft.com/office/powerpoint/2010/main" val="1455751151"/>
+      </p:ext>
+    </p:extLst>
+  </p:cSld>
+  <p:clrMapOvr>
+    <a:masterClrMapping/>
+  </p:clrMapOvr>
+  <p:timing>
+    <p:tnLst>
+      <p:par>
+        <p:cTn id="1" dur="indefinite" restart="never" nodeType="tmRoot"/>
+      </p:par>
+    </p:tnLst>
+  </p:timing>
+</p:sld>
+</file>
+
+<file path=ppt/slides/slide15.xml><?xml version="1.0" encoding="utf-8"?>
 <p:sld xmlns:a="http://schemas.openxmlformats.org/drawingml/2006/main" xmlns:r="http://schemas.openxmlformats.org/officeDocument/2006/relationships" xmlns:p="http://schemas.openxmlformats.org/presentationml/2006/main">
   <p:cSld>
     <p:spTree>
@@ -4902,7 +6195,7 @@
 </p:sld>
 </file>
 
-<file path=ppt/slides/slide13.xml><?xml version="1.0" encoding="utf-8"?>
+<file path=ppt/slides/slide16.xml><?xml version="1.0" encoding="utf-8"?>
 <p:sld xmlns:a="http://schemas.openxmlformats.org/drawingml/2006/main" xmlns:r="http://schemas.openxmlformats.org/officeDocument/2006/relationships" xmlns:p="http://schemas.openxmlformats.org/presentationml/2006/main">
   <p:cSld>
     <p:spTree>
@@ -6209,7 +7502,7 @@
 </p:sld>
 </file>
 
-<file path=ppt/slides/slide14.xml><?xml version="1.0" encoding="utf-8"?>
+<file path=ppt/slides/slide17.xml><?xml version="1.0" encoding="utf-8"?>
 <p:sld xmlns:a="http://schemas.openxmlformats.org/drawingml/2006/main" xmlns:r="http://schemas.openxmlformats.org/officeDocument/2006/relationships" xmlns:p="http://schemas.openxmlformats.org/presentationml/2006/main">
   <p:cSld>
     <p:spTree>
@@ -6299,7 +7592,7 @@
         </p:blipFill>
         <p:spPr bwMode="auto">
           <a:xfrm>
-            <a:off x="857224" y="2571744"/>
+            <a:off x="857223" y="1928182"/>
             <a:ext cx="7143751" cy="1590675"/>
           </a:xfrm>
           <a:prstGeom prst="rect">
@@ -6402,6 +7695,47 @@
           </a:p>
         </p:txBody>
       </p:sp>
+      <p:pic>
+        <p:nvPicPr>
+          <p:cNvPr id="2050" name="Picture 2" descr="Agile model in Software testing"/>
+          <p:cNvPicPr>
+            <a:picLocks noChangeAspect="1" noChangeArrowheads="1"/>
+          </p:cNvPicPr>
+          <p:nvPr/>
+        </p:nvPicPr>
+        <p:blipFill>
+          <a:blip r:embed="rId3">
+            <a:extLst>
+              <a:ext uri="{28A0092B-C50C-407E-A947-70E740481C1C}">
+                <a14:useLocalDpi xmlns:a14="http://schemas.microsoft.com/office/drawing/2010/main" val="0"/>
+              </a:ext>
+            </a:extLst>
+          </a:blip>
+          <a:srcRect/>
+          <a:stretch>
+            <a:fillRect/>
+          </a:stretch>
+        </p:blipFill>
+        <p:spPr bwMode="auto">
+          <a:xfrm>
+            <a:off x="1763688" y="3492759"/>
+            <a:ext cx="5328592" cy="2743829"/>
+          </a:xfrm>
+          <a:prstGeom prst="rect">
+            <a:avLst/>
+          </a:prstGeom>
+          <a:noFill/>
+          <a:extLst>
+            <a:ext uri="{909E8E84-426E-40DD-AFC4-6F175D3DCCD1}">
+              <a14:hiddenFill xmlns:a14="http://schemas.microsoft.com/office/drawing/2010/main">
+                <a:solidFill>
+                  <a:srgbClr val="FFFFFF"/>
+                </a:solidFill>
+              </a14:hiddenFill>
+            </a:ext>
+          </a:extLst>
+        </p:spPr>
+      </p:pic>
     </p:spTree>
     <p:extLst>
       <p:ext uri="{BB962C8B-B14F-4D97-AF65-F5344CB8AC3E}">
@@ -6422,210 +7756,7 @@
 </p:sld>
 </file>
 
-<file path=ppt/slides/slide15.xml><?xml version="1.0" encoding="utf-8"?>
-<p:sld xmlns:a="http://schemas.openxmlformats.org/drawingml/2006/main" xmlns:r="http://schemas.openxmlformats.org/officeDocument/2006/relationships" xmlns:p="http://schemas.openxmlformats.org/presentationml/2006/main">
-  <p:cSld>
-    <p:spTree>
-      <p:nvGrpSpPr>
-        <p:cNvPr id="1" name=""/>
-        <p:cNvGrpSpPr/>
-        <p:nvPr/>
-      </p:nvGrpSpPr>
-      <p:grpSpPr>
-        <a:xfrm>
-          <a:off x="0" y="0"/>
-          <a:ext cx="0" cy="0"/>
-          <a:chOff x="0" y="0"/>
-          <a:chExt cx="0" cy="0"/>
-        </a:xfrm>
-      </p:grpSpPr>
-      <p:sp>
-        <p:nvSpPr>
-          <p:cNvPr id="6" name="Rectangle 5"/>
-          <p:cNvSpPr/>
-          <p:nvPr/>
-        </p:nvSpPr>
-        <p:spPr>
-          <a:xfrm>
-            <a:off x="609600" y="1295400"/>
-            <a:ext cx="6122640" cy="369332"/>
-          </a:xfrm>
-          <a:prstGeom prst="rect">
-            <a:avLst/>
-          </a:prstGeom>
-        </p:spPr>
-        <p:txBody>
-          <a:bodyPr wrap="square">
-            <a:spAutoFit/>
-          </a:bodyPr>
-          <a:lstStyle/>
-          <a:p>
-            <a:pPr lvl="0"/>
-            <a:r>
-              <a:rPr lang="ru-RU" b="1" dirty="0" smtClean="0">
-                <a:solidFill>
-                  <a:srgbClr val="CC3300"/>
-                </a:solidFill>
-                <a:latin typeface="Arial" panose="020B0604020202020204" pitchFamily="34" charset="0"/>
-                <a:cs typeface="Arial" panose="020B0604020202020204" pitchFamily="34" charset="0"/>
-              </a:rPr>
-              <a:t>Частое предоставление </a:t>
-            </a:r>
-            <a:r>
-              <a:rPr lang="ru-RU" dirty="0" smtClean="0">
-                <a:latin typeface="Arial" panose="020B0604020202020204" pitchFamily="34" charset="0"/>
-                <a:cs typeface="Arial" panose="020B0604020202020204" pitchFamily="34" charset="0"/>
-              </a:rPr>
-              <a:t>стабильных версий продукта</a:t>
-            </a:r>
-            <a:endParaRPr lang="en-US" dirty="0">
-              <a:latin typeface="Arial" panose="020B0604020202020204" pitchFamily="34" charset="0"/>
-              <a:cs typeface="Arial" panose="020B0604020202020204" pitchFamily="34" charset="0"/>
-            </a:endParaRPr>
-          </a:p>
-        </p:txBody>
-      </p:sp>
-      <p:pic>
-        <p:nvPicPr>
-          <p:cNvPr id="1026" name="Picture 2" descr="C:\Users\Jul4a\Desktop\Testing\pics\Agile.jpg"/>
-          <p:cNvPicPr>
-            <a:picLocks noChangeAspect="1" noChangeArrowheads="1"/>
-          </p:cNvPicPr>
-          <p:nvPr/>
-        </p:nvPicPr>
-        <p:blipFill>
-          <a:blip r:embed="rId2"/>
-          <a:srcRect/>
-          <a:stretch>
-            <a:fillRect/>
-          </a:stretch>
-        </p:blipFill>
-        <p:spPr bwMode="auto">
-          <a:xfrm>
-            <a:off x="1714480" y="1714488"/>
-            <a:ext cx="5786478" cy="3668792"/>
-          </a:xfrm>
-          <a:prstGeom prst="rect">
-            <a:avLst/>
-          </a:prstGeom>
-          <a:noFill/>
-        </p:spPr>
-      </p:pic>
-      <p:sp>
-        <p:nvSpPr>
-          <p:cNvPr id="8" name="TextBox 7"/>
-          <p:cNvSpPr txBox="1"/>
-          <p:nvPr/>
-        </p:nvSpPr>
-        <p:spPr>
-          <a:xfrm>
-            <a:off x="457200" y="381000"/>
-            <a:ext cx="6813019" cy="630942"/>
-          </a:xfrm>
-          <a:prstGeom prst="rect">
-            <a:avLst/>
-          </a:prstGeom>
-          <a:noFill/>
-        </p:spPr>
-        <p:txBody>
-          <a:bodyPr wrap="none" rtlCol="0">
-            <a:spAutoFit/>
-          </a:bodyPr>
-          <a:lstStyle/>
-          <a:p>
-            <a:r>
-              <a:rPr lang="ru-RU" sz="3500" dirty="0">
-                <a:solidFill>
-                  <a:schemeClr val="tx1">
-                    <a:lumMod val="65000"/>
-                    <a:lumOff val="35000"/>
-                  </a:schemeClr>
-                </a:solidFill>
-                <a:effectLst>
-                  <a:outerShdw blurRad="38100" dist="38100" dir="2700000" algn="tl">
-                    <a:srgbClr val="000000">
-                      <a:alpha val="43137"/>
-                    </a:srgbClr>
-                  </a:outerShdw>
-                </a:effectLst>
-              </a:rPr>
-              <a:t>Ключевые моменты </a:t>
-            </a:r>
-            <a:r>
-              <a:rPr lang="en-US" sz="3500" dirty="0" smtClean="0">
-                <a:solidFill>
-                  <a:schemeClr val="tx1">
-                    <a:lumMod val="65000"/>
-                    <a:lumOff val="35000"/>
-                  </a:schemeClr>
-                </a:solidFill>
-                <a:effectLst>
-                  <a:outerShdw blurRad="38100" dist="38100" dir="2700000" algn="tl">
-                    <a:srgbClr val="000000">
-                      <a:alpha val="43137"/>
-                    </a:srgbClr>
-                  </a:outerShdw>
-                </a:effectLst>
-              </a:rPr>
-              <a:t>Agile </a:t>
-            </a:r>
-            <a:r>
-              <a:rPr lang="ru-RU" sz="3500" dirty="0" smtClean="0">
-                <a:solidFill>
-                  <a:schemeClr val="tx1">
-                    <a:lumMod val="65000"/>
-                    <a:lumOff val="35000"/>
-                  </a:schemeClr>
-                </a:solidFill>
-                <a:effectLst>
-                  <a:outerShdw blurRad="38100" dist="38100" dir="2700000" algn="tl">
-                    <a:srgbClr val="000000">
-                      <a:alpha val="43137"/>
-                    </a:srgbClr>
-                  </a:outerShdw>
-                </a:effectLst>
-              </a:rPr>
-              <a:t>моделей</a:t>
-            </a:r>
-            <a:endParaRPr lang="en-US" sz="3500" dirty="0">
-              <a:solidFill>
-                <a:schemeClr val="tx1">
-                  <a:lumMod val="65000"/>
-                  <a:lumOff val="35000"/>
-                </a:schemeClr>
-              </a:solidFill>
-              <a:effectLst>
-                <a:outerShdw blurRad="38100" dist="38100" dir="2700000" algn="tl">
-                  <a:srgbClr val="000000">
-                    <a:alpha val="43137"/>
-                  </a:srgbClr>
-                </a:outerShdw>
-              </a:effectLst>
-            </a:endParaRPr>
-          </a:p>
-        </p:txBody>
-      </p:sp>
-    </p:spTree>
-    <p:extLst>
-      <p:ext uri="{BB962C8B-B14F-4D97-AF65-F5344CB8AC3E}">
-        <p14:creationId xmlns:p14="http://schemas.microsoft.com/office/powerpoint/2010/main" val="3296969004"/>
-      </p:ext>
-    </p:extLst>
-  </p:cSld>
-  <p:clrMapOvr>
-    <a:masterClrMapping/>
-  </p:clrMapOvr>
-  <p:timing>
-    <p:tnLst>
-      <p:par>
-        <p:cTn id="1" dur="indefinite" restart="never" nodeType="tmRoot"/>
-      </p:par>
-    </p:tnLst>
-  </p:timing>
-</p:sld>
-</file>
-
-<file path=ppt/slides/slide16.xml><?xml version="1.0" encoding="utf-8"?>
+<file path=ppt/slides/slide18.xml><?xml version="1.0" encoding="utf-8"?>
 <p:sld xmlns:a="http://schemas.openxmlformats.org/drawingml/2006/main" xmlns:r="http://schemas.openxmlformats.org/officeDocument/2006/relationships" xmlns:p="http://schemas.openxmlformats.org/presentationml/2006/main">
   <p:cSld>
     <p:spTree>
@@ -6829,430 +7960,6 @@
     <p:extLst>
       <p:ext uri="{BB962C8B-B14F-4D97-AF65-F5344CB8AC3E}">
         <p14:creationId xmlns:p14="http://schemas.microsoft.com/office/powerpoint/2010/main" val="3296969004"/>
-      </p:ext>
-    </p:extLst>
-  </p:cSld>
-  <p:clrMapOvr>
-    <a:masterClrMapping/>
-  </p:clrMapOvr>
-  <p:timing>
-    <p:tnLst>
-      <p:par>
-        <p:cTn id="1" dur="indefinite" restart="never" nodeType="tmRoot"/>
-      </p:par>
-    </p:tnLst>
-  </p:timing>
-</p:sld>
-</file>
-
-<file path=ppt/slides/slide17.xml><?xml version="1.0" encoding="utf-8"?>
-<p:sld xmlns:a="http://schemas.openxmlformats.org/drawingml/2006/main" xmlns:r="http://schemas.openxmlformats.org/officeDocument/2006/relationships" xmlns:p="http://schemas.openxmlformats.org/presentationml/2006/main">
-  <p:cSld>
-    <p:spTree>
-      <p:nvGrpSpPr>
-        <p:cNvPr id="1" name=""/>
-        <p:cNvGrpSpPr/>
-        <p:nvPr/>
-      </p:nvGrpSpPr>
-      <p:grpSpPr>
-        <a:xfrm>
-          <a:off x="0" y="0"/>
-          <a:ext cx="0" cy="0"/>
-          <a:chOff x="0" y="0"/>
-          <a:chExt cx="0" cy="0"/>
-        </a:xfrm>
-      </p:grpSpPr>
-      <p:sp>
-        <p:nvSpPr>
-          <p:cNvPr id="4" name="TextBox 3"/>
-          <p:cNvSpPr txBox="1"/>
-          <p:nvPr/>
-        </p:nvSpPr>
-        <p:spPr>
-          <a:xfrm>
-            <a:off x="457200" y="533400"/>
-            <a:ext cx="6740115" cy="630942"/>
-          </a:xfrm>
-          <a:prstGeom prst="rect">
-            <a:avLst/>
-          </a:prstGeom>
-          <a:noFill/>
-        </p:spPr>
-        <p:txBody>
-          <a:bodyPr wrap="none" rtlCol="0">
-            <a:spAutoFit/>
-          </a:bodyPr>
-          <a:lstStyle/>
-          <a:p>
-            <a:r>
-              <a:rPr lang="ru-RU" sz="3500" dirty="0" smtClean="0">
-                <a:solidFill>
-                  <a:schemeClr val="tx1">
-                    <a:lumMod val="65000"/>
-                    <a:lumOff val="35000"/>
-                  </a:schemeClr>
-                </a:solidFill>
-                <a:effectLst>
-                  <a:outerShdw blurRad="38100" dist="38100" dir="2700000" algn="tl">
-                    <a:srgbClr val="000000">
-                      <a:alpha val="43137"/>
-                    </a:srgbClr>
-                  </a:outerShdw>
-                </a:effectLst>
-              </a:rPr>
-              <a:t>Основные роли в </a:t>
-            </a:r>
-            <a:r>
-              <a:rPr lang="en-US" sz="3500" dirty="0">
-                <a:solidFill>
-                  <a:schemeClr val="tx1">
-                    <a:lumMod val="65000"/>
-                    <a:lumOff val="35000"/>
-                  </a:schemeClr>
-                </a:solidFill>
-                <a:effectLst>
-                  <a:outerShdw blurRad="38100" dist="38100" dir="2700000" algn="tl">
-                    <a:srgbClr val="000000">
-                      <a:alpha val="43137"/>
-                    </a:srgbClr>
-                  </a:outerShdw>
-                </a:effectLst>
-              </a:rPr>
-              <a:t>Agile </a:t>
-            </a:r>
-            <a:r>
-              <a:rPr lang="ru-RU" sz="3500" dirty="0" smtClean="0">
-                <a:solidFill>
-                  <a:schemeClr val="tx1">
-                    <a:lumMod val="65000"/>
-                    <a:lumOff val="35000"/>
-                  </a:schemeClr>
-                </a:solidFill>
-                <a:effectLst>
-                  <a:outerShdw blurRad="38100" dist="38100" dir="2700000" algn="tl">
-                    <a:srgbClr val="000000">
-                      <a:alpha val="43137"/>
-                    </a:srgbClr>
-                  </a:outerShdw>
-                </a:effectLst>
-              </a:rPr>
-              <a:t>разработке</a:t>
-            </a:r>
-            <a:endParaRPr lang="en-US" sz="3500" dirty="0">
-              <a:solidFill>
-                <a:schemeClr val="tx1">
-                  <a:lumMod val="65000"/>
-                  <a:lumOff val="35000"/>
-                </a:schemeClr>
-              </a:solidFill>
-              <a:effectLst>
-                <a:outerShdw blurRad="38100" dist="38100" dir="2700000" algn="tl">
-                  <a:srgbClr val="000000">
-                    <a:alpha val="43137"/>
-                  </a:srgbClr>
-                </a:outerShdw>
-              </a:effectLst>
-            </a:endParaRPr>
-          </a:p>
-        </p:txBody>
-      </p:sp>
-      <p:sp>
-        <p:nvSpPr>
-          <p:cNvPr id="2" name="TextBox 1"/>
-          <p:cNvSpPr txBox="1"/>
-          <p:nvPr/>
-        </p:nvSpPr>
-        <p:spPr>
-          <a:xfrm>
-            <a:off x="1403648" y="1464618"/>
-            <a:ext cx="2457992" cy="3139321"/>
-          </a:xfrm>
-          <a:prstGeom prst="rect">
-            <a:avLst/>
-          </a:prstGeom>
-          <a:noFill/>
-        </p:spPr>
-        <p:txBody>
-          <a:bodyPr wrap="square" rtlCol="0">
-            <a:spAutoFit/>
-          </a:bodyPr>
-          <a:lstStyle/>
-          <a:p>
-            <a:pPr>
-              <a:lnSpc>
-                <a:spcPct val="300000"/>
-              </a:lnSpc>
-            </a:pPr>
-            <a:r>
-              <a:rPr lang="en-US" sz="2200" dirty="0">
-                <a:latin typeface="Aharoni" pitchFamily="2" charset="-79"/>
-                <a:cs typeface="Aharoni" pitchFamily="2" charset="-79"/>
-              </a:rPr>
-              <a:t>Team Master</a:t>
-            </a:r>
-          </a:p>
-          <a:p>
-            <a:pPr>
-              <a:lnSpc>
-                <a:spcPct val="300000"/>
-              </a:lnSpc>
-            </a:pPr>
-            <a:r>
-              <a:rPr lang="en-US" sz="2200" dirty="0" smtClean="0">
-                <a:latin typeface="Aharoni" pitchFamily="2" charset="-79"/>
-                <a:cs typeface="Aharoni" pitchFamily="2" charset="-79"/>
-              </a:rPr>
-              <a:t>Team</a:t>
-            </a:r>
-          </a:p>
-          <a:p>
-            <a:pPr>
-              <a:lnSpc>
-                <a:spcPct val="300000"/>
-              </a:lnSpc>
-            </a:pPr>
-            <a:r>
-              <a:rPr lang="en-US" sz="2200" dirty="0" smtClean="0">
-                <a:latin typeface="Aharoni" pitchFamily="2" charset="-79"/>
-                <a:cs typeface="Aharoni" pitchFamily="2" charset="-79"/>
-              </a:rPr>
-              <a:t>Product Owner</a:t>
-            </a:r>
-          </a:p>
-        </p:txBody>
-      </p:sp>
-      <p:pic>
-        <p:nvPicPr>
-          <p:cNvPr id="6146" name="Picture 2"/>
-          <p:cNvPicPr>
-            <a:picLocks noChangeAspect="1" noChangeArrowheads="1"/>
-          </p:cNvPicPr>
-          <p:nvPr/>
-        </p:nvPicPr>
-        <p:blipFill>
-          <a:blip r:embed="rId2">
-            <a:extLst>
-              <a:ext uri="{28A0092B-C50C-407E-A947-70E740481C1C}">
-                <a14:useLocalDpi xmlns:a14="http://schemas.microsoft.com/office/drawing/2010/main" val="0"/>
-              </a:ext>
-            </a:extLst>
-          </a:blip>
-          <a:srcRect/>
-          <a:stretch>
-            <a:fillRect/>
-          </a:stretch>
-        </p:blipFill>
-        <p:spPr bwMode="auto">
-          <a:xfrm flipH="1">
-            <a:off x="4932040" y="1669365"/>
-            <a:ext cx="3276058" cy="2788539"/>
-          </a:xfrm>
-          <a:prstGeom prst="roundRect">
-            <a:avLst>
-              <a:gd name="adj" fmla="val 8594"/>
-            </a:avLst>
-          </a:prstGeom>
-          <a:solidFill>
-            <a:srgbClr val="FFFFFF">
-              <a:shade val="85000"/>
-            </a:srgbClr>
-          </a:solidFill>
-          <a:ln>
-            <a:noFill/>
-          </a:ln>
-          <a:effectLst>
-            <a:reflection blurRad="12700" stA="38000" endPos="28000" dist="5000" dir="5400000" sy="-100000" algn="bl" rotWithShape="0"/>
-          </a:effectLst>
-          <a:extLst>
-            <a:ext uri="{91240B29-F687-4F45-9708-019B960494DF}">
-              <a14:hiddenLine xmlns:a14="http://schemas.microsoft.com/office/drawing/2010/main" w="9525">
-                <a:solidFill>
-                  <a:schemeClr val="tx1"/>
-                </a:solidFill>
-                <a:miter lim="800000"/>
-                <a:headEnd/>
-                <a:tailEnd/>
-              </a14:hiddenLine>
-            </a:ext>
-            <a:ext uri="{AF507438-7753-43E0-B8FC-AC1667EBCBE1}">
-              <a14:hiddenEffects xmlns:a14="http://schemas.microsoft.com/office/drawing/2010/main">
-                <a:effectLst>
-                  <a:outerShdw dist="35921" dir="2700000" algn="ctr" rotWithShape="0">
-                    <a:schemeClr val="bg2"/>
-                  </a:outerShdw>
-                </a:effectLst>
-              </a14:hiddenEffects>
-            </a:ext>
-          </a:extLst>
-        </p:spPr>
-      </p:pic>
-    </p:spTree>
-    <p:extLst>
-      <p:ext uri="{BB962C8B-B14F-4D97-AF65-F5344CB8AC3E}">
-        <p14:creationId xmlns:p14="http://schemas.microsoft.com/office/powerpoint/2010/main" val="3291001258"/>
-      </p:ext>
-    </p:extLst>
-  </p:cSld>
-  <p:clrMapOvr>
-    <a:masterClrMapping/>
-  </p:clrMapOvr>
-  <p:timing>
-    <p:tnLst>
-      <p:par>
-        <p:cTn id="1" dur="indefinite" restart="never" nodeType="tmRoot"/>
-      </p:par>
-    </p:tnLst>
-  </p:timing>
-</p:sld>
-</file>
-
-<file path=ppt/slides/slide18.xml><?xml version="1.0" encoding="utf-8"?>
-<p:sld xmlns:a="http://schemas.openxmlformats.org/drawingml/2006/main" xmlns:r="http://schemas.openxmlformats.org/officeDocument/2006/relationships" xmlns:p="http://schemas.openxmlformats.org/presentationml/2006/main">
-  <p:cSld>
-    <p:spTree>
-      <p:nvGrpSpPr>
-        <p:cNvPr id="1" name=""/>
-        <p:cNvGrpSpPr/>
-        <p:nvPr/>
-      </p:nvGrpSpPr>
-      <p:grpSpPr>
-        <a:xfrm>
-          <a:off x="0" y="0"/>
-          <a:ext cx="0" cy="0"/>
-          <a:chOff x="0" y="0"/>
-          <a:chExt cx="0" cy="0"/>
-        </a:xfrm>
-      </p:grpSpPr>
-      <p:sp>
-        <p:nvSpPr>
-          <p:cNvPr id="4" name="TextBox 3"/>
-          <p:cNvSpPr txBox="1"/>
-          <p:nvPr/>
-        </p:nvSpPr>
-        <p:spPr>
-          <a:xfrm>
-            <a:off x="457200" y="533400"/>
-            <a:ext cx="7628691" cy="630942"/>
-          </a:xfrm>
-          <a:prstGeom prst="rect">
-            <a:avLst/>
-          </a:prstGeom>
-          <a:noFill/>
-        </p:spPr>
-        <p:txBody>
-          <a:bodyPr wrap="none" rtlCol="0">
-            <a:spAutoFit/>
-          </a:bodyPr>
-          <a:lstStyle/>
-          <a:p>
-            <a:r>
-              <a:rPr lang="ru-RU" sz="3500" dirty="0" smtClean="0">
-                <a:solidFill>
-                  <a:schemeClr val="tx1">
-                    <a:lumMod val="65000"/>
-                    <a:lumOff val="35000"/>
-                  </a:schemeClr>
-                </a:solidFill>
-                <a:effectLst>
-                  <a:outerShdw blurRad="38100" dist="38100" dir="2700000" algn="tl">
-                    <a:srgbClr val="000000">
-                      <a:alpha val="43137"/>
-                    </a:srgbClr>
-                  </a:outerShdw>
-                </a:effectLst>
-              </a:rPr>
-              <a:t>Повторяющийся цикл </a:t>
-            </a:r>
-            <a:r>
-              <a:rPr lang="en-US" sz="3500" dirty="0">
-                <a:solidFill>
-                  <a:schemeClr val="tx1">
-                    <a:lumMod val="65000"/>
-                    <a:lumOff val="35000"/>
-                  </a:schemeClr>
-                </a:solidFill>
-                <a:effectLst>
-                  <a:outerShdw blurRad="38100" dist="38100" dir="2700000" algn="tl">
-                    <a:srgbClr val="000000">
-                      <a:alpha val="43137"/>
-                    </a:srgbClr>
-                  </a:outerShdw>
-                </a:effectLst>
-              </a:rPr>
-              <a:t>Agile </a:t>
-            </a:r>
-            <a:r>
-              <a:rPr lang="ru-RU" sz="3500" dirty="0" smtClean="0">
-                <a:solidFill>
-                  <a:schemeClr val="tx1">
-                    <a:lumMod val="65000"/>
-                    <a:lumOff val="35000"/>
-                  </a:schemeClr>
-                </a:solidFill>
-                <a:effectLst>
-                  <a:outerShdw blurRad="38100" dist="38100" dir="2700000" algn="tl">
-                    <a:srgbClr val="000000">
-                      <a:alpha val="43137"/>
-                    </a:srgbClr>
-                  </a:outerShdw>
-                </a:effectLst>
-              </a:rPr>
-              <a:t>разработки</a:t>
-            </a:r>
-            <a:endParaRPr lang="en-US" sz="3500" dirty="0">
-              <a:solidFill>
-                <a:schemeClr val="tx1">
-                  <a:lumMod val="65000"/>
-                  <a:lumOff val="35000"/>
-                </a:schemeClr>
-              </a:solidFill>
-              <a:effectLst>
-                <a:outerShdw blurRad="38100" dist="38100" dir="2700000" algn="tl">
-                  <a:srgbClr val="000000">
-                    <a:alpha val="43137"/>
-                  </a:srgbClr>
-                </a:outerShdw>
-              </a:effectLst>
-            </a:endParaRPr>
-          </a:p>
-        </p:txBody>
-      </p:sp>
-      <p:pic>
-        <p:nvPicPr>
-          <p:cNvPr id="5" name="Picture 2"/>
-          <p:cNvPicPr>
-            <a:picLocks noChangeAspect="1" noChangeArrowheads="1"/>
-          </p:cNvPicPr>
-          <p:nvPr/>
-        </p:nvPicPr>
-        <p:blipFill>
-          <a:blip r:embed="rId2" cstate="print"/>
-          <a:srcRect/>
-          <a:stretch>
-            <a:fillRect/>
-          </a:stretch>
-        </p:blipFill>
-        <p:spPr bwMode="auto">
-          <a:xfrm>
-            <a:off x="571472" y="1571612"/>
-            <a:ext cx="7712248" cy="3581400"/>
-          </a:xfrm>
-          <a:prstGeom prst="rect">
-            <a:avLst/>
-          </a:prstGeom>
-          <a:noFill/>
-          <a:ln w="9525">
-            <a:noFill/>
-            <a:miter lim="800000"/>
-            <a:headEnd/>
-            <a:tailEnd/>
-          </a:ln>
-        </p:spPr>
-      </p:pic>
-    </p:spTree>
-    <p:extLst>
-      <p:ext uri="{BB962C8B-B14F-4D97-AF65-F5344CB8AC3E}">
-        <p14:creationId xmlns:p14="http://schemas.microsoft.com/office/powerpoint/2010/main" val="3987702581"/>
       </p:ext>
     </p:extLst>
   </p:cSld>
@@ -8495,7 +9202,33 @@
                 <a:latin typeface="Arial" panose="020B0604020202020204" pitchFamily="34" charset="0"/>
                 <a:cs typeface="Arial" panose="020B0604020202020204" pitchFamily="34" charset="0"/>
               </a:rPr>
-              <a:t>Scrum, RUP, XP, FDD</a:t>
+              <a:t>Scrum, </a:t>
+            </a:r>
+            <a:r>
+              <a:rPr lang="en-US" dirty="0" smtClean="0">
+                <a:solidFill>
+                  <a:schemeClr val="tx1">
+                    <a:lumMod val="65000"/>
+                    <a:lumOff val="35000"/>
+                  </a:schemeClr>
+                </a:solidFill>
+                <a:latin typeface="Arial" panose="020B0604020202020204" pitchFamily="34" charset="0"/>
+                <a:cs typeface="Arial" panose="020B0604020202020204" pitchFamily="34" charset="0"/>
+              </a:rPr>
+              <a:t>RUP, </a:t>
+            </a:r>
+            <a:r>
+              <a:rPr lang="en-US" dirty="0">
+                <a:solidFill>
+                  <a:schemeClr val="tx1">
+                    <a:lumMod val="65000"/>
+                    <a:lumOff val="35000"/>
+                  </a:schemeClr>
+                </a:solidFill>
+                <a:latin typeface="Arial" panose="020B0604020202020204" pitchFamily="34" charset="0"/>
+                <a:cs typeface="Arial" panose="020B0604020202020204" pitchFamily="34" charset="0"/>
+              </a:rPr>
+              <a:t>XP, FDD</a:t>
             </a:r>
             <a:endParaRPr lang="ru-RU" dirty="0" smtClean="0">
               <a:solidFill>
@@ -9591,6 +10324,412 @@
           <a:chExt cx="0" cy="0"/>
         </a:xfrm>
       </p:grpSpPr>
+      <p:sp>
+        <p:nvSpPr>
+          <p:cNvPr id="4" name="TextBox 3"/>
+          <p:cNvSpPr txBox="1"/>
+          <p:nvPr/>
+        </p:nvSpPr>
+        <p:spPr>
+          <a:xfrm>
+            <a:off x="755576" y="476672"/>
+            <a:ext cx="7877156" cy="630942"/>
+          </a:xfrm>
+          <a:prstGeom prst="rect">
+            <a:avLst/>
+          </a:prstGeom>
+          <a:noFill/>
+        </p:spPr>
+        <p:txBody>
+          <a:bodyPr wrap="none" rtlCol="0">
+            <a:spAutoFit/>
+          </a:bodyPr>
+          <a:lstStyle/>
+          <a:p>
+            <a:r>
+              <a:rPr lang="ru-RU" sz="3500" dirty="0" smtClean="0">
+                <a:solidFill>
+                  <a:schemeClr val="tx1">
+                    <a:lumMod val="65000"/>
+                    <a:lumOff val="35000"/>
+                  </a:schemeClr>
+                </a:solidFill>
+                <a:effectLst>
+                  <a:outerShdw blurRad="38100" dist="38100" dir="2700000" algn="tl">
+                    <a:srgbClr val="000000">
+                      <a:alpha val="43137"/>
+                    </a:srgbClr>
+                  </a:outerShdw>
+                </a:effectLst>
+              </a:rPr>
+              <a:t>Повторяющийся цикл </a:t>
+            </a:r>
+            <a:r>
+              <a:rPr lang="en-US" sz="3500" dirty="0" smtClean="0">
+                <a:solidFill>
+                  <a:schemeClr val="tx1">
+                    <a:lumMod val="65000"/>
+                    <a:lumOff val="35000"/>
+                  </a:schemeClr>
+                </a:solidFill>
+                <a:effectLst>
+                  <a:outerShdw blurRad="38100" dist="38100" dir="2700000" algn="tl">
+                    <a:srgbClr val="000000">
+                      <a:alpha val="43137"/>
+                    </a:srgbClr>
+                  </a:outerShdw>
+                </a:effectLst>
+              </a:rPr>
+              <a:t>Scrum </a:t>
+            </a:r>
+            <a:r>
+              <a:rPr lang="ru-RU" sz="3500" dirty="0" smtClean="0">
+                <a:solidFill>
+                  <a:schemeClr val="tx1">
+                    <a:lumMod val="65000"/>
+                    <a:lumOff val="35000"/>
+                  </a:schemeClr>
+                </a:solidFill>
+                <a:effectLst>
+                  <a:outerShdw blurRad="38100" dist="38100" dir="2700000" algn="tl">
+                    <a:srgbClr val="000000">
+                      <a:alpha val="43137"/>
+                    </a:srgbClr>
+                  </a:outerShdw>
+                </a:effectLst>
+              </a:rPr>
+              <a:t>разработки</a:t>
+            </a:r>
+            <a:endParaRPr lang="en-US" sz="3500" dirty="0">
+              <a:solidFill>
+                <a:schemeClr val="tx1">
+                  <a:lumMod val="65000"/>
+                  <a:lumOff val="35000"/>
+                </a:schemeClr>
+              </a:solidFill>
+              <a:effectLst>
+                <a:outerShdw blurRad="38100" dist="38100" dir="2700000" algn="tl">
+                  <a:srgbClr val="000000">
+                    <a:alpha val="43137"/>
+                  </a:srgbClr>
+                </a:outerShdw>
+              </a:effectLst>
+            </a:endParaRPr>
+          </a:p>
+        </p:txBody>
+      </p:sp>
+      <p:pic>
+        <p:nvPicPr>
+          <p:cNvPr id="5" name="Picture 2"/>
+          <p:cNvPicPr>
+            <a:picLocks noChangeAspect="1" noChangeArrowheads="1"/>
+          </p:cNvPicPr>
+          <p:nvPr/>
+        </p:nvPicPr>
+        <p:blipFill>
+          <a:blip r:embed="rId2" cstate="print"/>
+          <a:srcRect/>
+          <a:stretch>
+            <a:fillRect/>
+          </a:stretch>
+        </p:blipFill>
+        <p:spPr bwMode="auto">
+          <a:xfrm>
+            <a:off x="616902" y="1556792"/>
+            <a:ext cx="7712248" cy="3581400"/>
+          </a:xfrm>
+          <a:prstGeom prst="rect">
+            <a:avLst/>
+          </a:prstGeom>
+          <a:noFill/>
+          <a:ln w="9525">
+            <a:noFill/>
+            <a:miter lim="800000"/>
+            <a:headEnd/>
+            <a:tailEnd/>
+          </a:ln>
+        </p:spPr>
+      </p:pic>
+    </p:spTree>
+    <p:extLst>
+      <p:ext uri="{BB962C8B-B14F-4D97-AF65-F5344CB8AC3E}">
+        <p14:creationId xmlns:p14="http://schemas.microsoft.com/office/powerpoint/2010/main" val="3987702581"/>
+      </p:ext>
+    </p:extLst>
+  </p:cSld>
+  <p:clrMapOvr>
+    <a:masterClrMapping/>
+  </p:clrMapOvr>
+  <p:timing>
+    <p:tnLst>
+      <p:par>
+        <p:cTn id="1" dur="indefinite" restart="never" nodeType="tmRoot"/>
+      </p:par>
+    </p:tnLst>
+  </p:timing>
+</p:sld>
+</file>
+
+<file path=ppt/slides/slide22.xml><?xml version="1.0" encoding="utf-8"?>
+<p:sld xmlns:a="http://schemas.openxmlformats.org/drawingml/2006/main" xmlns:r="http://schemas.openxmlformats.org/officeDocument/2006/relationships" xmlns:p="http://schemas.openxmlformats.org/presentationml/2006/main">
+  <p:cSld>
+    <p:spTree>
+      <p:nvGrpSpPr>
+        <p:cNvPr id="1" name=""/>
+        <p:cNvGrpSpPr/>
+        <p:nvPr/>
+      </p:nvGrpSpPr>
+      <p:grpSpPr>
+        <a:xfrm>
+          <a:off x="0" y="0"/>
+          <a:ext cx="0" cy="0"/>
+          <a:chOff x="0" y="0"/>
+          <a:chExt cx="0" cy="0"/>
+        </a:xfrm>
+      </p:grpSpPr>
+      <p:sp>
+        <p:nvSpPr>
+          <p:cNvPr id="4" name="TextBox 3"/>
+          <p:cNvSpPr txBox="1"/>
+          <p:nvPr/>
+        </p:nvSpPr>
+        <p:spPr>
+          <a:xfrm>
+            <a:off x="2195736" y="548680"/>
+            <a:ext cx="4725653" cy="630942"/>
+          </a:xfrm>
+          <a:prstGeom prst="rect">
+            <a:avLst/>
+          </a:prstGeom>
+          <a:noFill/>
+        </p:spPr>
+        <p:txBody>
+          <a:bodyPr wrap="none" rtlCol="0">
+            <a:spAutoFit/>
+          </a:bodyPr>
+          <a:lstStyle/>
+          <a:p>
+            <a:r>
+              <a:rPr lang="ru-RU" sz="3500" dirty="0" smtClean="0">
+                <a:solidFill>
+                  <a:schemeClr val="tx1">
+                    <a:lumMod val="65000"/>
+                    <a:lumOff val="35000"/>
+                  </a:schemeClr>
+                </a:solidFill>
+                <a:effectLst>
+                  <a:outerShdw blurRad="38100" dist="38100" dir="2700000" algn="tl">
+                    <a:srgbClr val="000000">
+                      <a:alpha val="43137"/>
+                    </a:srgbClr>
+                  </a:outerShdw>
+                </a:effectLst>
+              </a:rPr>
+              <a:t>Основные роли в </a:t>
+            </a:r>
+            <a:r>
+              <a:rPr lang="en-US" sz="3500" dirty="0" smtClean="0">
+                <a:solidFill>
+                  <a:schemeClr val="tx1">
+                    <a:lumMod val="65000"/>
+                    <a:lumOff val="35000"/>
+                  </a:schemeClr>
+                </a:solidFill>
+                <a:effectLst>
+                  <a:outerShdw blurRad="38100" dist="38100" dir="2700000" algn="tl">
+                    <a:srgbClr val="000000">
+                      <a:alpha val="43137"/>
+                    </a:srgbClr>
+                  </a:outerShdw>
+                </a:effectLst>
+              </a:rPr>
+              <a:t>Scrum</a:t>
+            </a:r>
+            <a:endParaRPr lang="en-US" sz="3500" dirty="0">
+              <a:solidFill>
+                <a:schemeClr val="tx1">
+                  <a:lumMod val="65000"/>
+                  <a:lumOff val="35000"/>
+                </a:schemeClr>
+              </a:solidFill>
+              <a:effectLst>
+                <a:outerShdw blurRad="38100" dist="38100" dir="2700000" algn="tl">
+                  <a:srgbClr val="000000">
+                    <a:alpha val="43137"/>
+                  </a:srgbClr>
+                </a:outerShdw>
+              </a:effectLst>
+            </a:endParaRPr>
+          </a:p>
+        </p:txBody>
+      </p:sp>
+      <p:sp>
+        <p:nvSpPr>
+          <p:cNvPr id="2" name="TextBox 1"/>
+          <p:cNvSpPr txBox="1"/>
+          <p:nvPr/>
+        </p:nvSpPr>
+        <p:spPr>
+          <a:xfrm>
+            <a:off x="1403648" y="1464618"/>
+            <a:ext cx="2457992" cy="3139321"/>
+          </a:xfrm>
+          <a:prstGeom prst="rect">
+            <a:avLst/>
+          </a:prstGeom>
+          <a:noFill/>
+        </p:spPr>
+        <p:txBody>
+          <a:bodyPr wrap="square" rtlCol="0">
+            <a:spAutoFit/>
+          </a:bodyPr>
+          <a:lstStyle/>
+          <a:p>
+            <a:pPr>
+              <a:lnSpc>
+                <a:spcPct val="300000"/>
+              </a:lnSpc>
+            </a:pPr>
+            <a:r>
+              <a:rPr lang="en-US" sz="2200" dirty="0">
+                <a:latin typeface="Aharoni" pitchFamily="2" charset="-79"/>
+                <a:cs typeface="Aharoni" pitchFamily="2" charset="-79"/>
+              </a:rPr>
+              <a:t>Team Master</a:t>
+            </a:r>
+          </a:p>
+          <a:p>
+            <a:pPr>
+              <a:lnSpc>
+                <a:spcPct val="300000"/>
+              </a:lnSpc>
+            </a:pPr>
+            <a:r>
+              <a:rPr lang="en-US" sz="2200" dirty="0" smtClean="0">
+                <a:latin typeface="Aharoni" pitchFamily="2" charset="-79"/>
+                <a:cs typeface="Aharoni" pitchFamily="2" charset="-79"/>
+              </a:rPr>
+              <a:t>Team</a:t>
+            </a:r>
+          </a:p>
+          <a:p>
+            <a:pPr>
+              <a:lnSpc>
+                <a:spcPct val="300000"/>
+              </a:lnSpc>
+            </a:pPr>
+            <a:r>
+              <a:rPr lang="en-US" sz="2200" dirty="0" smtClean="0">
+                <a:latin typeface="Aharoni" pitchFamily="2" charset="-79"/>
+                <a:cs typeface="Aharoni" pitchFamily="2" charset="-79"/>
+              </a:rPr>
+              <a:t>Product Owner</a:t>
+            </a:r>
+          </a:p>
+        </p:txBody>
+      </p:sp>
+      <p:pic>
+        <p:nvPicPr>
+          <p:cNvPr id="6146" name="Picture 2"/>
+          <p:cNvPicPr>
+            <a:picLocks noChangeAspect="1" noChangeArrowheads="1"/>
+          </p:cNvPicPr>
+          <p:nvPr/>
+        </p:nvPicPr>
+        <p:blipFill>
+          <a:blip r:embed="rId2">
+            <a:extLst>
+              <a:ext uri="{28A0092B-C50C-407E-A947-70E740481C1C}">
+                <a14:useLocalDpi xmlns:a14="http://schemas.microsoft.com/office/drawing/2010/main" val="0"/>
+              </a:ext>
+            </a:extLst>
+          </a:blip>
+          <a:srcRect/>
+          <a:stretch>
+            <a:fillRect/>
+          </a:stretch>
+        </p:blipFill>
+        <p:spPr bwMode="auto">
+          <a:xfrm flipH="1">
+            <a:off x="4932040" y="1669365"/>
+            <a:ext cx="3276058" cy="2788539"/>
+          </a:xfrm>
+          <a:prstGeom prst="roundRect">
+            <a:avLst>
+              <a:gd name="adj" fmla="val 8594"/>
+            </a:avLst>
+          </a:prstGeom>
+          <a:solidFill>
+            <a:srgbClr val="FFFFFF">
+              <a:shade val="85000"/>
+            </a:srgbClr>
+          </a:solidFill>
+          <a:ln>
+            <a:noFill/>
+          </a:ln>
+          <a:effectLst>
+            <a:reflection blurRad="12700" stA="38000" endPos="28000" dist="5000" dir="5400000" sy="-100000" algn="bl" rotWithShape="0"/>
+          </a:effectLst>
+          <a:extLst>
+            <a:ext uri="{91240B29-F687-4F45-9708-019B960494DF}">
+              <a14:hiddenLine xmlns:a14="http://schemas.microsoft.com/office/drawing/2010/main" w="9525">
+                <a:solidFill>
+                  <a:schemeClr val="tx1"/>
+                </a:solidFill>
+                <a:miter lim="800000"/>
+                <a:headEnd/>
+                <a:tailEnd/>
+              </a14:hiddenLine>
+            </a:ext>
+            <a:ext uri="{AF507438-7753-43E0-B8FC-AC1667EBCBE1}">
+              <a14:hiddenEffects xmlns:a14="http://schemas.microsoft.com/office/drawing/2010/main">
+                <a:effectLst>
+                  <a:outerShdw dist="35921" dir="2700000" algn="ctr" rotWithShape="0">
+                    <a:schemeClr val="bg2"/>
+                  </a:outerShdw>
+                </a:effectLst>
+              </a14:hiddenEffects>
+            </a:ext>
+          </a:extLst>
+        </p:spPr>
+      </p:pic>
+    </p:spTree>
+    <p:extLst>
+      <p:ext uri="{BB962C8B-B14F-4D97-AF65-F5344CB8AC3E}">
+        <p14:creationId xmlns:p14="http://schemas.microsoft.com/office/powerpoint/2010/main" val="3291001258"/>
+      </p:ext>
+    </p:extLst>
+  </p:cSld>
+  <p:clrMapOvr>
+    <a:masterClrMapping/>
+  </p:clrMapOvr>
+  <p:timing>
+    <p:tnLst>
+      <p:par>
+        <p:cTn id="1" dur="indefinite" restart="never" nodeType="tmRoot"/>
+      </p:par>
+    </p:tnLst>
+  </p:timing>
+</p:sld>
+</file>
+
+<file path=ppt/slides/slide23.xml><?xml version="1.0" encoding="utf-8"?>
+<p:sld xmlns:a="http://schemas.openxmlformats.org/drawingml/2006/main" xmlns:r="http://schemas.openxmlformats.org/officeDocument/2006/relationships" xmlns:p="http://schemas.openxmlformats.org/presentationml/2006/main">
+  <p:cSld>
+    <p:spTree>
+      <p:nvGrpSpPr>
+        <p:cNvPr id="1" name=""/>
+        <p:cNvGrpSpPr/>
+        <p:nvPr/>
+      </p:nvGrpSpPr>
+      <p:grpSpPr>
+        <a:xfrm>
+          <a:off x="0" y="0"/>
+          <a:ext cx="0" cy="0"/>
+          <a:chOff x="0" y="0"/>
+          <a:chExt cx="0" cy="0"/>
+        </a:xfrm>
+      </p:grpSpPr>
       <p:pic>
         <p:nvPicPr>
           <p:cNvPr id="1026" name="Picture 2" descr="C:\Users\jkad\Desktop\Trainings\Testing\Key-Steps-in-Automated-Testing.jpg"/>
@@ -10051,43 +11190,6 @@
       </p:sp>
       <p:sp>
         <p:nvSpPr>
-          <p:cNvPr id="2" name="Rectangle 1"/>
-          <p:cNvSpPr/>
-          <p:nvPr/>
-        </p:nvSpPr>
-        <p:spPr>
-          <a:xfrm>
-            <a:off x="2617794" y="4807803"/>
-            <a:ext cx="3270447" cy="369332"/>
-          </a:xfrm>
-          <a:prstGeom prst="rect">
-            <a:avLst/>
-          </a:prstGeom>
-        </p:spPr>
-        <p:txBody>
-          <a:bodyPr wrap="none">
-            <a:spAutoFit/>
-          </a:bodyPr>
-          <a:lstStyle/>
-          <a:p>
-            <a:r>
-              <a:rPr lang="en-US" dirty="0">
-                <a:solidFill>
-                  <a:schemeClr val="tx1">
-                    <a:lumMod val="65000"/>
-                    <a:lumOff val="35000"/>
-                  </a:schemeClr>
-                </a:solidFill>
-                <a:latin typeface="Aharoni" pitchFamily="2" charset="-79"/>
-                <a:cs typeface="Aharoni" pitchFamily="2" charset="-79"/>
-              </a:rPr>
-              <a:t>Iterative Development (RUP)</a:t>
-            </a:r>
-          </a:p>
-        </p:txBody>
-      </p:sp>
-      <p:sp>
-        <p:nvSpPr>
           <p:cNvPr id="16" name="Rectangle 15"/>
           <p:cNvSpPr/>
           <p:nvPr/>
@@ -10191,6 +11293,92 @@
           </a:p>
         </p:txBody>
       </p:sp>
+      <p:sp>
+        <p:nvSpPr>
+          <p:cNvPr id="18" name="Rectangle 17"/>
+          <p:cNvSpPr/>
+          <p:nvPr/>
+        </p:nvSpPr>
+        <p:spPr>
+          <a:xfrm>
+            <a:off x="2617266" y="4803338"/>
+            <a:ext cx="3926932" cy="369332"/>
+          </a:xfrm>
+          <a:prstGeom prst="rect">
+            <a:avLst/>
+          </a:prstGeom>
+        </p:spPr>
+        <p:txBody>
+          <a:bodyPr wrap="square">
+            <a:spAutoFit/>
+          </a:bodyPr>
+          <a:lstStyle/>
+          <a:p>
+            <a:r>
+              <a:rPr lang="en-US" dirty="0">
+                <a:solidFill>
+                  <a:schemeClr val="tx1">
+                    <a:lumMod val="65000"/>
+                    <a:lumOff val="35000"/>
+                  </a:schemeClr>
+                </a:solidFill>
+                <a:latin typeface="Aharoni" pitchFamily="2" charset="-79"/>
+                <a:cs typeface="Aharoni" pitchFamily="2" charset="-79"/>
+              </a:rPr>
+              <a:t>Rational Unified </a:t>
+            </a:r>
+            <a:r>
+              <a:rPr lang="en-US" dirty="0" smtClean="0">
+                <a:solidFill>
+                  <a:schemeClr val="tx1">
+                    <a:lumMod val="65000"/>
+                    <a:lumOff val="35000"/>
+                  </a:schemeClr>
+                </a:solidFill>
+                <a:latin typeface="Aharoni" pitchFamily="2" charset="-79"/>
+                <a:cs typeface="Aharoni" pitchFamily="2" charset="-79"/>
+              </a:rPr>
+              <a:t>Process (</a:t>
+            </a:r>
+            <a:r>
+              <a:rPr lang="en-US" dirty="0">
+                <a:solidFill>
+                  <a:schemeClr val="tx1">
+                    <a:lumMod val="65000"/>
+                    <a:lumOff val="35000"/>
+                  </a:schemeClr>
+                </a:solidFill>
+                <a:latin typeface="Aharoni" pitchFamily="2" charset="-79"/>
+                <a:cs typeface="Aharoni" pitchFamily="2" charset="-79"/>
+              </a:rPr>
+              <a:t>RUP</a:t>
+            </a:r>
+            <a:r>
+              <a:rPr lang="en-US" dirty="0" smtClean="0">
+                <a:solidFill>
+                  <a:schemeClr val="tx1">
+                    <a:lumMod val="65000"/>
+                    <a:lumOff val="35000"/>
+                  </a:schemeClr>
+                </a:solidFill>
+                <a:latin typeface="Aharoni" pitchFamily="2" charset="-79"/>
+                <a:cs typeface="Aharoni" pitchFamily="2" charset="-79"/>
+              </a:rPr>
+              <a:t>)</a:t>
+            </a:r>
+            <a:endParaRPr lang="en-US" dirty="0">
+              <a:solidFill>
+                <a:schemeClr val="tx1">
+                  <a:lumMod val="65000"/>
+                  <a:lumOff val="35000"/>
+                </a:schemeClr>
+              </a:solidFill>
+              <a:latin typeface="Aharoni" pitchFamily="2" charset="-79"/>
+              <a:cs typeface="Aharoni" pitchFamily="2" charset="-79"/>
+            </a:endParaRPr>
+          </a:p>
+        </p:txBody>
+      </p:sp>
     </p:spTree>
     <p:extLst>
       <p:ext uri="{BB962C8B-B14F-4D97-AF65-F5344CB8AC3E}">
@@ -10211,7 +11399,7 @@
 </p:sld>
 </file>
 
-<file path=ppt/slides/slide22.xml><?xml version="1.0" encoding="utf-8"?>
+<file path=ppt/slides/slide24.xml><?xml version="1.0" encoding="utf-8"?>
 <p:sld xmlns:a="http://schemas.openxmlformats.org/drawingml/2006/main" xmlns:r="http://schemas.openxmlformats.org/officeDocument/2006/relationships" xmlns:p="http://schemas.openxmlformats.org/presentationml/2006/main">
   <p:cSld>
     <p:spTree>
@@ -12792,11 +13980,7 @@
             </a:r>
             <a:r>
               <a:rPr lang="ru-RU" sz="2400" dirty="0" smtClean="0"/>
-              <a:t>: </a:t>
-            </a:r>
-            <a:r>
-              <a:rPr lang="ru-RU" sz="2400" dirty="0" smtClean="0"/>
-              <a:t>готовое решение</a:t>
+              <a:t>: готовое решение</a:t>
             </a:r>
           </a:p>
         </p:txBody>
@@ -12846,7 +14030,7 @@
         </p:nvSpPr>
         <p:spPr>
           <a:xfrm>
-            <a:off x="2298026" y="2133600"/>
+            <a:off x="1626361" y="2844064"/>
             <a:ext cx="1747090" cy="422318"/>
           </a:xfrm>
           <a:prstGeom prst="rect">
@@ -12915,7 +14099,7 @@
         </p:nvSpPr>
         <p:spPr>
           <a:xfrm>
-            <a:off x="2821514" y="3085873"/>
+            <a:off x="2662701" y="3612680"/>
             <a:ext cx="1612699" cy="422318"/>
           </a:xfrm>
           <a:prstGeom prst="rect">
@@ -13000,7 +14184,7 @@
         </p:nvSpPr>
         <p:spPr>
           <a:xfrm>
-            <a:off x="3485787" y="4009939"/>
+            <a:off x="3641347" y="4381296"/>
             <a:ext cx="1747090" cy="422318"/>
           </a:xfrm>
           <a:prstGeom prst="rect">
@@ -13069,7 +14253,7 @@
         </p:nvSpPr>
         <p:spPr>
           <a:xfrm>
-            <a:off x="4220614" y="4883514"/>
+            <a:off x="4821987" y="5159344"/>
             <a:ext cx="1747090" cy="422318"/>
           </a:xfrm>
           <a:prstGeom prst="rect">
@@ -13138,7 +14322,7 @@
         </p:nvSpPr>
         <p:spPr>
           <a:xfrm>
-            <a:off x="5079159" y="5791200"/>
+            <a:off x="5695532" y="5968406"/>
             <a:ext cx="1747090" cy="422318"/>
           </a:xfrm>
           <a:prstGeom prst="rect">
@@ -13207,7 +14391,7 @@
         </p:nvSpPr>
         <p:spPr>
           <a:xfrm>
-            <a:off x="1619672" y="1257246"/>
+            <a:off x="611560" y="2132856"/>
             <a:ext cx="1747090" cy="422318"/>
           </a:xfrm>
           <a:prstGeom prst="rect">
@@ -13279,12 +14463,12 @@
         </p:nvCxnSpPr>
         <p:spPr>
           <a:xfrm>
-            <a:off x="3366762" y="1468405"/>
-            <a:ext cx="678354" cy="876354"/>
+            <a:off x="2358650" y="2344015"/>
+            <a:ext cx="1014801" cy="711208"/>
           </a:xfrm>
           <a:prstGeom prst="curvedConnector3">
             <a:avLst>
-              <a:gd name="adj1" fmla="val 133699"/>
+              <a:gd name="adj1" fmla="val 122527"/>
             </a:avLst>
           </a:prstGeom>
           <a:ln w="12700">
@@ -13324,12 +14508,12 @@
         </p:nvCxnSpPr>
         <p:spPr>
           <a:xfrm>
-            <a:off x="4045116" y="2344759"/>
-            <a:ext cx="389097" cy="952273"/>
+            <a:off x="3373451" y="3055223"/>
+            <a:ext cx="901949" cy="768616"/>
           </a:xfrm>
           <a:prstGeom prst="curvedConnector3">
             <a:avLst>
-              <a:gd name="adj1" fmla="val 158751"/>
+              <a:gd name="adj1" fmla="val 125345"/>
             </a:avLst>
           </a:prstGeom>
           <a:ln w="12700">
@@ -13369,12 +14553,12 @@
         </p:nvCxnSpPr>
         <p:spPr>
           <a:xfrm>
-            <a:off x="4434213" y="3297032"/>
-            <a:ext cx="798664" cy="924066"/>
+            <a:off x="4275400" y="3823839"/>
+            <a:ext cx="1113037" cy="768616"/>
           </a:xfrm>
           <a:prstGeom prst="curvedConnector3">
             <a:avLst>
-              <a:gd name="adj1" fmla="val 128623"/>
+              <a:gd name="adj1" fmla="val 120538"/>
             </a:avLst>
           </a:prstGeom>
           <a:ln w="12700">
@@ -13414,12 +14598,12 @@
         </p:nvCxnSpPr>
         <p:spPr>
           <a:xfrm>
-            <a:off x="5232877" y="4221098"/>
-            <a:ext cx="734827" cy="873575"/>
+            <a:off x="5388437" y="4592455"/>
+            <a:ext cx="1180640" cy="778048"/>
           </a:xfrm>
           <a:prstGeom prst="curvedConnector3">
             <a:avLst>
-              <a:gd name="adj1" fmla="val 131109"/>
+              <a:gd name="adj1" fmla="val 119362"/>
             </a:avLst>
           </a:prstGeom>
           <a:ln w="12700">
@@ -13459,12 +14643,12 @@
         </p:nvCxnSpPr>
         <p:spPr>
           <a:xfrm>
-            <a:off x="5967704" y="5094673"/>
-            <a:ext cx="858545" cy="907686"/>
+            <a:off x="6569077" y="5370503"/>
+            <a:ext cx="873545" cy="809062"/>
           </a:xfrm>
           <a:prstGeom prst="curvedConnector3">
             <a:avLst>
-              <a:gd name="adj1" fmla="val 126626"/>
+              <a:gd name="adj1" fmla="val 126169"/>
             </a:avLst>
           </a:prstGeom>
           <a:ln w="12700">
@@ -13501,8 +14685,8 @@
         </p:nvSpPr>
         <p:spPr>
           <a:xfrm>
-            <a:off x="596955" y="404664"/>
-            <a:ext cx="8326062" cy="584775"/>
+            <a:off x="3093152" y="188640"/>
+            <a:ext cx="3016340" cy="584775"/>
           </a:xfrm>
           <a:prstGeom prst="rect">
             <a:avLst/>
@@ -13515,34 +14699,60 @@
           </a:bodyPr>
           <a:lstStyle/>
           <a:p>
-            <a:r>
-              <a:rPr lang="ru-RU" sz="3200" dirty="0" smtClean="0">
-                <a:solidFill>
-                  <a:schemeClr val="tx1">
-                    <a:lumMod val="65000"/>
-                    <a:lumOff val="35000"/>
+            <a:pPr algn="ctr"/>
+            <a:r>
+              <a:rPr lang="en-US" sz="3200" dirty="0" smtClean="0">
+                <a:solidFill>
+                  <a:schemeClr val="tx1">
+                    <a:lumMod val="50000"/>
+                    <a:lumOff val="50000"/>
                   </a:schemeClr>
                 </a:solidFill>
                 <a:latin typeface="Arial" panose="020B0604020202020204" pitchFamily="34" charset="0"/>
                 <a:cs typeface="Arial" panose="020B0604020202020204" pitchFamily="34" charset="0"/>
               </a:rPr>
-              <a:t>Традиционные подходы к разработке ПО</a:t>
+              <a:t>Waterfall model</a:t>
             </a:r>
             <a:endParaRPr lang="en-US" sz="3000" dirty="0">
               <a:solidFill>
                 <a:schemeClr val="tx1">
-                  <a:lumMod val="65000"/>
-                  <a:lumOff val="35000"/>
+                  <a:lumMod val="50000"/>
+                  <a:lumOff val="50000"/>
                 </a:schemeClr>
               </a:solidFill>
-              <a:effectLst>
-                <a:outerShdw blurRad="38100" dist="38100" dir="2700000" algn="tl">
-                  <a:srgbClr val="000000">
-                    <a:alpha val="43137"/>
-                  </a:srgbClr>
-                </a:outerShdw>
-              </a:effectLst>
             </a:endParaRPr>
+          </a:p>
+        </p:txBody>
+      </p:sp>
+      <p:sp>
+        <p:nvSpPr>
+          <p:cNvPr id="33" name="Rectangle 32"/>
+          <p:cNvSpPr/>
+          <p:nvPr/>
+        </p:nvSpPr>
+        <p:spPr>
+          <a:xfrm>
+            <a:off x="467544" y="1210627"/>
+            <a:ext cx="7321996" cy="369332"/>
+          </a:xfrm>
+          <a:prstGeom prst="rect">
+            <a:avLst/>
+          </a:prstGeom>
+        </p:spPr>
+        <p:txBody>
+          <a:bodyPr wrap="square">
+            <a:spAutoFit/>
+          </a:bodyPr>
+          <a:lstStyle/>
+          <a:p>
+            <a:r>
+              <a:rPr lang="en-US" dirty="0" smtClean="0"/>
+              <a:t>Each </a:t>
+            </a:r>
+            <a:r>
+              <a:rPr lang="en-US" dirty="0"/>
+              <a:t>phase must be completed fully before the next phase can begin. </a:t>
+            </a:r>
           </a:p>
         </p:txBody>
       </p:sp>
@@ -13585,14 +14795,237 @@
       </p:grpSpPr>
       <p:sp>
         <p:nvSpPr>
+          <p:cNvPr id="2" name="Title 1"/>
+          <p:cNvSpPr>
+            <a:spLocks noGrp="1"/>
+          </p:cNvSpPr>
+          <p:nvPr>
+            <p:ph type="title"/>
+          </p:nvPr>
+        </p:nvSpPr>
+        <p:spPr>
+          <a:xfrm>
+            <a:off x="2627784" y="260648"/>
+            <a:ext cx="8229600" cy="1143000"/>
+          </a:xfrm>
+        </p:spPr>
+        <p:txBody>
+          <a:bodyPr>
+            <a:normAutofit fontScale="90000"/>
+          </a:bodyPr>
+          <a:lstStyle/>
+          <a:p>
+            <a:r>
+              <a:rPr lang="en-US" sz="3600" dirty="0">
+                <a:solidFill>
+                  <a:schemeClr val="tx1">
+                    <a:lumMod val="50000"/>
+                    <a:lumOff val="50000"/>
+                  </a:schemeClr>
+                </a:solidFill>
+                <a:latin typeface="Arial" panose="020B0604020202020204" pitchFamily="34" charset="0"/>
+                <a:cs typeface="Arial" panose="020B0604020202020204" pitchFamily="34" charset="0"/>
+              </a:rPr>
+              <a:t>Waterfall model</a:t>
+            </a:r>
+            <a:r>
+              <a:rPr lang="en-US" dirty="0">
+                <a:solidFill>
+                  <a:schemeClr val="tx1">
+                    <a:lumMod val="50000"/>
+                    <a:lumOff val="50000"/>
+                  </a:schemeClr>
+                </a:solidFill>
+              </a:rPr>
+              <a:t/>
+            </a:r>
+            <a:br>
+              <a:rPr lang="en-US" dirty="0">
+                <a:solidFill>
+                  <a:schemeClr val="tx1">
+                    <a:lumMod val="50000"/>
+                    <a:lumOff val="50000"/>
+                  </a:schemeClr>
+                </a:solidFill>
+              </a:rPr>
+            </a:br>
+            <a:endParaRPr lang="en-US" dirty="0"/>
+          </a:p>
+        </p:txBody>
+      </p:sp>
+      <p:sp>
+        <p:nvSpPr>
+          <p:cNvPr id="3" name="Content Placeholder 2"/>
+          <p:cNvSpPr>
+            <a:spLocks noGrp="1"/>
+          </p:cNvSpPr>
+          <p:nvPr>
+            <p:ph idx="1"/>
+          </p:nvPr>
+        </p:nvSpPr>
+        <p:spPr>
+          <a:xfrm>
+            <a:off x="457200" y="908720"/>
+            <a:ext cx="8229600" cy="5217443"/>
+          </a:xfrm>
+        </p:spPr>
+        <p:txBody>
+          <a:bodyPr>
+            <a:normAutofit fontScale="55000" lnSpcReduction="20000"/>
+          </a:bodyPr>
+          <a:lstStyle/>
+          <a:p>
+            <a:pPr marL="0" indent="0">
+              <a:buNone/>
+            </a:pPr>
+            <a:r>
+              <a:rPr lang="en-US" b="1" dirty="0"/>
+              <a:t>Advantages of waterfall model:</a:t>
+            </a:r>
+            <a:br>
+              <a:rPr lang="en-US" b="1" dirty="0"/>
+            </a:br>
+            <a:endParaRPr lang="en-US" dirty="0"/>
+          </a:p>
+          <a:p>
+            <a:r>
+              <a:rPr lang="en-US" dirty="0"/>
+              <a:t>This model is simple and easy to understand and use.</a:t>
+            </a:r>
+          </a:p>
+          <a:p>
+            <a:r>
+              <a:rPr lang="en-US" dirty="0"/>
+              <a:t>It is easy to manage due to the rigidity of the model – each phase has specific deliverables and a review process.</a:t>
+            </a:r>
+          </a:p>
+          <a:p>
+            <a:r>
+              <a:rPr lang="en-US" dirty="0"/>
+              <a:t>In this model phases are processed and completed one at a time. Phases do not overlap.</a:t>
+            </a:r>
+          </a:p>
+          <a:p>
+            <a:r>
+              <a:rPr lang="en-US" dirty="0"/>
+              <a:t>Waterfall model works well for smaller projects where requirements are very well understood</a:t>
+            </a:r>
+            <a:r>
+              <a:rPr lang="en-US" dirty="0" smtClean="0"/>
+              <a:t>.</a:t>
+            </a:r>
+          </a:p>
+          <a:p>
+            <a:pPr marL="0" indent="0">
+              <a:buNone/>
+            </a:pPr>
+            <a:endParaRPr lang="en-US" dirty="0"/>
+          </a:p>
+          <a:p>
+            <a:pPr marL="0" indent="0">
+              <a:buNone/>
+            </a:pPr>
+            <a:endParaRPr lang="en-US" dirty="0"/>
+          </a:p>
+          <a:p>
+            <a:pPr marL="0" indent="0">
+              <a:buNone/>
+            </a:pPr>
+            <a:r>
+              <a:rPr lang="en-US" b="1" dirty="0"/>
+              <a:t> Disadvantages of waterfall model:</a:t>
+            </a:r>
+            <a:endParaRPr lang="en-US" dirty="0"/>
+          </a:p>
+          <a:p>
+            <a:r>
+              <a:rPr lang="en-US" dirty="0"/>
+              <a:t>Once an application is in </a:t>
+            </a:r>
+            <a:r>
+              <a:rPr lang="en-US" dirty="0" smtClean="0"/>
+              <a:t>the testing stage</a:t>
+            </a:r>
+            <a:r>
+              <a:rPr lang="en-US" dirty="0"/>
+              <a:t>, it is very difficult to go back and change something that was not well-thought out in the concept stage.</a:t>
+            </a:r>
+          </a:p>
+          <a:p>
+            <a:r>
+              <a:rPr lang="en-US" dirty="0"/>
+              <a:t>No working software is produced until late during the life cycle.</a:t>
+            </a:r>
+          </a:p>
+          <a:p>
+            <a:r>
+              <a:rPr lang="en-US" dirty="0"/>
+              <a:t>High amounts of risk and uncertainty.</a:t>
+            </a:r>
+          </a:p>
+          <a:p>
+            <a:r>
+              <a:rPr lang="en-US" dirty="0"/>
+              <a:t>Not a good model for complex and object-oriented projects.</a:t>
+            </a:r>
+          </a:p>
+          <a:p>
+            <a:r>
+              <a:rPr lang="en-US" dirty="0"/>
+              <a:t>Poor model for long and ongoing projects.</a:t>
+            </a:r>
+          </a:p>
+          <a:p>
+            <a:r>
+              <a:rPr lang="en-US" dirty="0"/>
+              <a:t>Not suitable for the projects where requirements are at a moderate to high risk of changing.</a:t>
+            </a:r>
+          </a:p>
+          <a:p>
+            <a:endParaRPr lang="en-US" dirty="0"/>
+          </a:p>
+        </p:txBody>
+      </p:sp>
+    </p:spTree>
+    <p:extLst>
+      <p:ext uri="{BB962C8B-B14F-4D97-AF65-F5344CB8AC3E}">
+        <p14:creationId xmlns:p14="http://schemas.microsoft.com/office/powerpoint/2010/main" val="3069886742"/>
+      </p:ext>
+    </p:extLst>
+  </p:cSld>
+  <p:clrMapOvr>
+    <a:masterClrMapping/>
+  </p:clrMapOvr>
+</p:sld>
+</file>
+
+<file path=ppt/slides/slide9.xml><?xml version="1.0" encoding="utf-8"?>
+<p:sld xmlns:a="http://schemas.openxmlformats.org/drawingml/2006/main" xmlns:r="http://schemas.openxmlformats.org/officeDocument/2006/relationships" xmlns:p="http://schemas.openxmlformats.org/presentationml/2006/main">
+  <p:cSld>
+    <p:spTree>
+      <p:nvGrpSpPr>
+        <p:cNvPr id="1" name=""/>
+        <p:cNvGrpSpPr/>
+        <p:nvPr/>
+      </p:nvGrpSpPr>
+      <p:grpSpPr>
+        <a:xfrm>
+          <a:off x="0" y="0"/>
+          <a:ext cx="0" cy="0"/>
+          <a:chOff x="0" y="0"/>
+          <a:chExt cx="0" cy="0"/>
+        </a:xfrm>
+      </p:grpSpPr>
+      <p:sp>
+        <p:nvSpPr>
           <p:cNvPr id="4" name="TextBox 3"/>
           <p:cNvSpPr txBox="1"/>
           <p:nvPr/>
         </p:nvSpPr>
         <p:spPr>
           <a:xfrm>
-            <a:off x="596955" y="404664"/>
-            <a:ext cx="8326062" cy="584775"/>
+            <a:off x="3411746" y="188640"/>
+            <a:ext cx="1776448" cy="646331"/>
           </a:xfrm>
           <a:prstGeom prst="rect">
             <a:avLst/>
@@ -13605,24 +15038,23 @@
           </a:bodyPr>
           <a:lstStyle/>
           <a:p>
-            <a:r>
-              <a:rPr lang="ru-RU" sz="3200" dirty="0" smtClean="0">
-                <a:solidFill>
-                  <a:schemeClr val="tx1">
-                    <a:lumMod val="65000"/>
-                    <a:lumOff val="35000"/>
-                  </a:schemeClr>
-                </a:solidFill>
-                <a:latin typeface="Arial" panose="020B0604020202020204" pitchFamily="34" charset="0"/>
-                <a:cs typeface="Arial" panose="020B0604020202020204" pitchFamily="34" charset="0"/>
-              </a:rPr>
-              <a:t>Традиционные подходы к разработке ПО</a:t>
-            </a:r>
-            <a:endParaRPr lang="en-US" sz="3000" dirty="0">
+            <a:pPr algn="ctr"/>
+            <a:r>
+              <a:rPr lang="en-US" sz="3600" dirty="0" smtClean="0">
+                <a:solidFill>
+                  <a:schemeClr val="tx1">
+                    <a:lumMod val="50000"/>
+                    <a:lumOff val="50000"/>
+                  </a:schemeClr>
+                </a:solidFill>
+              </a:rPr>
+              <a:t>V-model</a:t>
+            </a:r>
+            <a:endParaRPr lang="en-US" sz="3600" dirty="0">
               <a:solidFill>
                 <a:schemeClr val="tx1">
-                  <a:lumMod val="65000"/>
-                  <a:lumOff val="35000"/>
+                  <a:lumMod val="50000"/>
+                  <a:lumOff val="50000"/>
                 </a:schemeClr>
               </a:solidFill>
               <a:effectLst>
@@ -13658,7 +15090,7 @@
         </p:blipFill>
         <p:spPr>
           <a:xfrm>
-            <a:off x="1043608" y="1486224"/>
+            <a:off x="1043608" y="1977657"/>
             <a:ext cx="6512724" cy="4103016"/>
           </a:xfrm>
           <a:prstGeom prst="rect">
@@ -13666,793 +15098,16 @@
           </a:prstGeom>
         </p:spPr>
       </p:pic>
-    </p:spTree>
-    <p:extLst>
-      <p:ext uri="{BB962C8B-B14F-4D97-AF65-F5344CB8AC3E}">
-        <p14:creationId xmlns:p14="http://schemas.microsoft.com/office/powerpoint/2010/main" val="1148965532"/>
-      </p:ext>
-    </p:extLst>
-  </p:cSld>
-  <p:clrMapOvr>
-    <a:masterClrMapping/>
-  </p:clrMapOvr>
-  <p:timing>
-    <p:tnLst>
-      <p:par>
-        <p:cTn id="1" dur="indefinite" restart="never" nodeType="tmRoot"/>
-      </p:par>
-    </p:tnLst>
-  </p:timing>
-</p:sld>
-</file>
-
-<file path=ppt/slides/slide9.xml><?xml version="1.0" encoding="utf-8"?>
-<p:sld xmlns:a="http://schemas.openxmlformats.org/drawingml/2006/main" xmlns:r="http://schemas.openxmlformats.org/officeDocument/2006/relationships" xmlns:p="http://schemas.openxmlformats.org/presentationml/2006/main">
-  <p:cSld>
-    <p:spTree>
-      <p:nvGrpSpPr>
-        <p:cNvPr id="1" name=""/>
-        <p:cNvGrpSpPr/>
-        <p:nvPr/>
-      </p:nvGrpSpPr>
-      <p:grpSpPr>
-        <a:xfrm>
-          <a:off x="0" y="0"/>
-          <a:ext cx="0" cy="0"/>
-          <a:chOff x="0" y="0"/>
-          <a:chExt cx="0" cy="0"/>
-        </a:xfrm>
-      </p:grpSpPr>
       <p:sp>
         <p:nvSpPr>
-          <p:cNvPr id="5" name="Rectangle 4"/>
-          <p:cNvSpPr/>
-          <p:nvPr/>
-        </p:nvSpPr>
-        <p:spPr>
-          <a:xfrm>
-            <a:off x="1691680" y="1986930"/>
-            <a:ext cx="1584176" cy="720080"/>
-          </a:xfrm>
-          <a:prstGeom prst="rect">
-            <a:avLst/>
-          </a:prstGeom>
-          <a:noFill/>
-          <a:ln w="12700">
-            <a:solidFill>
-              <a:schemeClr val="tx1">
-                <a:lumMod val="50000"/>
-                <a:lumOff val="50000"/>
-              </a:schemeClr>
-            </a:solidFill>
-          </a:ln>
-        </p:spPr>
-        <p:style>
-          <a:lnRef idx="1">
-            <a:schemeClr val="accent5"/>
-          </a:lnRef>
-          <a:fillRef idx="3">
-            <a:schemeClr val="accent5"/>
-          </a:fillRef>
-          <a:effectRef idx="2">
-            <a:schemeClr val="accent5"/>
-          </a:effectRef>
-          <a:fontRef idx="minor">
-            <a:schemeClr val="lt1"/>
-          </a:fontRef>
-        </p:style>
-        <p:txBody>
-          <a:bodyPr rtlCol="0" anchor="ctr"/>
-          <a:lstStyle/>
-          <a:p>
-            <a:pPr algn="ctr"/>
-            <a:r>
-              <a:rPr lang="en-US" sz="1500" dirty="0">
-                <a:solidFill>
-                  <a:schemeClr val="tx1">
-                    <a:lumMod val="65000"/>
-                    <a:lumOff val="35000"/>
-                  </a:schemeClr>
-                </a:solidFill>
-                <a:latin typeface="Aharoni" pitchFamily="2" charset="-79"/>
-                <a:cs typeface="Aharoni" pitchFamily="2" charset="-79"/>
-              </a:rPr>
-              <a:t>Requirements Gathering</a:t>
-            </a:r>
-          </a:p>
-        </p:txBody>
-      </p:sp>
-      <p:cxnSp>
-        <p:nvCxnSpPr>
-          <p:cNvPr id="7" name="Straight Arrow Connector 6"/>
-          <p:cNvCxnSpPr>
-            <a:stCxn id="5" idx="3"/>
-            <a:endCxn id="8" idx="1"/>
-          </p:cNvCxnSpPr>
-          <p:nvPr/>
-        </p:nvCxnSpPr>
-        <p:spPr>
-          <a:xfrm flipV="1">
-            <a:off x="3275856" y="2338611"/>
-            <a:ext cx="720080" cy="8359"/>
-          </a:xfrm>
-          <a:prstGeom prst="straightConnector1">
-            <a:avLst/>
-          </a:prstGeom>
-          <a:ln w="28575">
-            <a:solidFill>
-              <a:schemeClr val="tx1">
-                <a:lumMod val="50000"/>
-                <a:lumOff val="50000"/>
-              </a:schemeClr>
-            </a:solidFill>
-            <a:tailEnd type="stealth" w="lg" len="lg"/>
-          </a:ln>
-        </p:spPr>
-        <p:style>
-          <a:lnRef idx="1">
-            <a:schemeClr val="accent5"/>
-          </a:lnRef>
-          <a:fillRef idx="3">
-            <a:schemeClr val="accent5"/>
-          </a:fillRef>
-          <a:effectRef idx="2">
-            <a:schemeClr val="accent5"/>
-          </a:effectRef>
-          <a:fontRef idx="minor">
-            <a:schemeClr val="lt1"/>
-          </a:fontRef>
-        </p:style>
-      </p:cxnSp>
-      <p:sp>
-        <p:nvSpPr>
-          <p:cNvPr id="8" name="Rectangle 7"/>
-          <p:cNvSpPr/>
-          <p:nvPr/>
-        </p:nvSpPr>
-        <p:spPr>
-          <a:xfrm>
-            <a:off x="3995936" y="1978571"/>
-            <a:ext cx="1584176" cy="720080"/>
-          </a:xfrm>
-          <a:prstGeom prst="rect">
-            <a:avLst/>
-          </a:prstGeom>
-          <a:noFill/>
-          <a:ln w="12700">
-            <a:solidFill>
-              <a:schemeClr val="tx1">
-                <a:lumMod val="50000"/>
-                <a:lumOff val="50000"/>
-              </a:schemeClr>
-            </a:solidFill>
-          </a:ln>
-        </p:spPr>
-        <p:style>
-          <a:lnRef idx="1">
-            <a:schemeClr val="accent5"/>
-          </a:lnRef>
-          <a:fillRef idx="3">
-            <a:schemeClr val="accent5"/>
-          </a:fillRef>
-          <a:effectRef idx="2">
-            <a:schemeClr val="accent5"/>
-          </a:effectRef>
-          <a:fontRef idx="minor">
-            <a:schemeClr val="lt1"/>
-          </a:fontRef>
-        </p:style>
-        <p:txBody>
-          <a:bodyPr rtlCol="0" anchor="ctr"/>
-          <a:lstStyle/>
-          <a:p>
-            <a:pPr algn="ctr"/>
-            <a:r>
-              <a:rPr lang="en-US" sz="1500" dirty="0">
-                <a:solidFill>
-                  <a:schemeClr val="tx1">
-                    <a:lumMod val="65000"/>
-                    <a:lumOff val="35000"/>
-                  </a:schemeClr>
-                </a:solidFill>
-                <a:latin typeface="Aharoni" pitchFamily="2" charset="-79"/>
-                <a:cs typeface="Aharoni" pitchFamily="2" charset="-79"/>
-              </a:rPr>
-              <a:t>Quick Design</a:t>
-            </a:r>
-          </a:p>
-        </p:txBody>
-      </p:sp>
-      <p:sp>
-        <p:nvSpPr>
-          <p:cNvPr id="9" name="Rectangle 8"/>
-          <p:cNvSpPr/>
-          <p:nvPr/>
-        </p:nvSpPr>
-        <p:spPr>
-          <a:xfrm>
-            <a:off x="6339061" y="1986930"/>
-            <a:ext cx="1584176" cy="720080"/>
-          </a:xfrm>
-          <a:prstGeom prst="rect">
-            <a:avLst/>
-          </a:prstGeom>
-          <a:noFill/>
-          <a:ln w="12700">
-            <a:solidFill>
-              <a:schemeClr val="tx1">
-                <a:lumMod val="50000"/>
-                <a:lumOff val="50000"/>
-              </a:schemeClr>
-            </a:solidFill>
-          </a:ln>
-        </p:spPr>
-        <p:style>
-          <a:lnRef idx="1">
-            <a:schemeClr val="accent5"/>
-          </a:lnRef>
-          <a:fillRef idx="3">
-            <a:schemeClr val="accent5"/>
-          </a:fillRef>
-          <a:effectRef idx="2">
-            <a:schemeClr val="accent5"/>
-          </a:effectRef>
-          <a:fontRef idx="minor">
-            <a:schemeClr val="lt1"/>
-          </a:fontRef>
-        </p:style>
-        <p:txBody>
-          <a:bodyPr rtlCol="0" anchor="ctr"/>
-          <a:lstStyle/>
-          <a:p>
-            <a:pPr algn="ctr"/>
-            <a:r>
-              <a:rPr lang="en-US" sz="1500" dirty="0">
-                <a:solidFill>
-                  <a:schemeClr val="tx1">
-                    <a:lumMod val="65000"/>
-                    <a:lumOff val="35000"/>
-                  </a:schemeClr>
-                </a:solidFill>
-                <a:latin typeface="Aharoni" pitchFamily="2" charset="-79"/>
-                <a:cs typeface="Aharoni" pitchFamily="2" charset="-79"/>
-              </a:rPr>
-              <a:t>Building Prototype</a:t>
-            </a:r>
-          </a:p>
-        </p:txBody>
-      </p:sp>
-      <p:sp>
-        <p:nvSpPr>
-          <p:cNvPr id="10" name="Rectangle 9"/>
-          <p:cNvSpPr/>
-          <p:nvPr/>
-        </p:nvSpPr>
-        <p:spPr>
-          <a:xfrm>
-            <a:off x="6339061" y="3499098"/>
-            <a:ext cx="1584176" cy="720080"/>
-          </a:xfrm>
-          <a:prstGeom prst="rect">
-            <a:avLst/>
-          </a:prstGeom>
-          <a:noFill/>
-          <a:ln w="12700">
-            <a:solidFill>
-              <a:schemeClr val="tx1">
-                <a:lumMod val="50000"/>
-                <a:lumOff val="50000"/>
-              </a:schemeClr>
-            </a:solidFill>
-          </a:ln>
-        </p:spPr>
-        <p:style>
-          <a:lnRef idx="1">
-            <a:schemeClr val="accent5"/>
-          </a:lnRef>
-          <a:fillRef idx="3">
-            <a:schemeClr val="accent5"/>
-          </a:fillRef>
-          <a:effectRef idx="2">
-            <a:schemeClr val="accent5"/>
-          </a:effectRef>
-          <a:fontRef idx="minor">
-            <a:schemeClr val="lt1"/>
-          </a:fontRef>
-        </p:style>
-        <p:txBody>
-          <a:bodyPr rtlCol="0" anchor="ctr"/>
-          <a:lstStyle/>
-          <a:p>
-            <a:pPr algn="ctr"/>
-            <a:r>
-              <a:rPr lang="en-US" sz="1500" dirty="0">
-                <a:solidFill>
-                  <a:schemeClr val="tx1">
-                    <a:lumMod val="65000"/>
-                    <a:lumOff val="35000"/>
-                  </a:schemeClr>
-                </a:solidFill>
-                <a:latin typeface="Aharoni" pitchFamily="2" charset="-79"/>
-                <a:cs typeface="Aharoni" pitchFamily="2" charset="-79"/>
-              </a:rPr>
-              <a:t>Customer Evaluation</a:t>
-            </a:r>
-          </a:p>
-        </p:txBody>
-      </p:sp>
-      <p:sp>
-        <p:nvSpPr>
-          <p:cNvPr id="11" name="Rectangle 10"/>
-          <p:cNvSpPr/>
-          <p:nvPr/>
-        </p:nvSpPr>
-        <p:spPr>
-          <a:xfrm>
-            <a:off x="3995936" y="3499098"/>
-            <a:ext cx="1584176" cy="720080"/>
-          </a:xfrm>
-          <a:prstGeom prst="rect">
-            <a:avLst/>
-          </a:prstGeom>
-          <a:noFill/>
-          <a:ln w="12700">
-            <a:solidFill>
-              <a:schemeClr val="tx1">
-                <a:lumMod val="50000"/>
-                <a:lumOff val="50000"/>
-              </a:schemeClr>
-            </a:solidFill>
-          </a:ln>
-        </p:spPr>
-        <p:style>
-          <a:lnRef idx="1">
-            <a:schemeClr val="accent5"/>
-          </a:lnRef>
-          <a:fillRef idx="3">
-            <a:schemeClr val="accent5"/>
-          </a:fillRef>
-          <a:effectRef idx="2">
-            <a:schemeClr val="accent5"/>
-          </a:effectRef>
-          <a:fontRef idx="minor">
-            <a:schemeClr val="lt1"/>
-          </a:fontRef>
-        </p:style>
-        <p:txBody>
-          <a:bodyPr rtlCol="0" anchor="ctr"/>
-          <a:lstStyle/>
-          <a:p>
-            <a:pPr algn="ctr"/>
-            <a:r>
-              <a:rPr lang="en-US" sz="1500" dirty="0">
-                <a:solidFill>
-                  <a:schemeClr val="tx1">
-                    <a:lumMod val="65000"/>
-                    <a:lumOff val="35000"/>
-                  </a:schemeClr>
-                </a:solidFill>
-                <a:latin typeface="Aharoni" pitchFamily="2" charset="-79"/>
-                <a:cs typeface="Aharoni" pitchFamily="2" charset="-79"/>
-              </a:rPr>
-              <a:t>Refining Prototype</a:t>
-            </a:r>
-          </a:p>
-        </p:txBody>
-      </p:sp>
-      <p:sp>
-        <p:nvSpPr>
-          <p:cNvPr id="12" name="Rectangle 11"/>
-          <p:cNvSpPr/>
-          <p:nvPr/>
-        </p:nvSpPr>
-        <p:spPr>
-          <a:xfrm>
-            <a:off x="1691680" y="3501008"/>
-            <a:ext cx="1584176" cy="720080"/>
-          </a:xfrm>
-          <a:prstGeom prst="rect">
-            <a:avLst/>
-          </a:prstGeom>
-          <a:noFill/>
-          <a:ln w="12700">
-            <a:solidFill>
-              <a:schemeClr val="tx1">
-                <a:lumMod val="50000"/>
-                <a:lumOff val="50000"/>
-              </a:schemeClr>
-            </a:solidFill>
-          </a:ln>
-        </p:spPr>
-        <p:style>
-          <a:lnRef idx="1">
-            <a:schemeClr val="accent5"/>
-          </a:lnRef>
-          <a:fillRef idx="3">
-            <a:schemeClr val="accent5"/>
-          </a:fillRef>
-          <a:effectRef idx="2">
-            <a:schemeClr val="accent5"/>
-          </a:effectRef>
-          <a:fontRef idx="minor">
-            <a:schemeClr val="lt1"/>
-          </a:fontRef>
-        </p:style>
-        <p:txBody>
-          <a:bodyPr rtlCol="0" anchor="ctr"/>
-          <a:lstStyle/>
-          <a:p>
-            <a:pPr algn="ctr"/>
-            <a:r>
-              <a:rPr lang="en-US" sz="1500" dirty="0" smtClean="0">
-                <a:solidFill>
-                  <a:schemeClr val="tx1">
-                    <a:lumMod val="65000"/>
-                    <a:lumOff val="35000"/>
-                  </a:schemeClr>
-                </a:solidFill>
-                <a:latin typeface="Aharoni" pitchFamily="2" charset="-79"/>
-                <a:cs typeface="Aharoni" pitchFamily="2" charset="-79"/>
-              </a:rPr>
-              <a:t>Product</a:t>
-            </a:r>
-          </a:p>
-          <a:p>
-            <a:pPr algn="ctr"/>
-            <a:r>
-              <a:rPr lang="en-US" sz="1500" dirty="0" smtClean="0">
-                <a:solidFill>
-                  <a:schemeClr val="tx1">
-                    <a:lumMod val="65000"/>
-                    <a:lumOff val="35000"/>
-                  </a:schemeClr>
-                </a:solidFill>
-                <a:latin typeface="Aharoni" pitchFamily="2" charset="-79"/>
-                <a:cs typeface="Aharoni" pitchFamily="2" charset="-79"/>
-              </a:rPr>
-              <a:t>Development</a:t>
-            </a:r>
-            <a:endParaRPr lang="ru-RU" sz="1500" dirty="0" smtClean="0">
-              <a:solidFill>
-                <a:schemeClr val="tx1">
-                  <a:lumMod val="65000"/>
-                  <a:lumOff val="35000"/>
-                </a:schemeClr>
-              </a:solidFill>
-              <a:latin typeface="Aharoni" pitchFamily="2" charset="-79"/>
-              <a:cs typeface="Aharoni" pitchFamily="2" charset="-79"/>
-            </a:endParaRPr>
-          </a:p>
-          <a:p>
-            <a:pPr algn="ctr"/>
-            <a:r>
-              <a:rPr lang="en-US" sz="1500" dirty="0" smtClean="0">
-                <a:solidFill>
-                  <a:schemeClr val="tx1">
-                    <a:lumMod val="65000"/>
-                    <a:lumOff val="35000"/>
-                  </a:schemeClr>
-                </a:solidFill>
-                <a:latin typeface="Aharoni" pitchFamily="2" charset="-79"/>
-                <a:cs typeface="Aharoni" pitchFamily="2" charset="-79"/>
-              </a:rPr>
-              <a:t>and Testing</a:t>
-            </a:r>
-            <a:endParaRPr lang="en-US" sz="1500" dirty="0">
-              <a:solidFill>
-                <a:schemeClr val="tx1">
-                  <a:lumMod val="65000"/>
-                  <a:lumOff val="35000"/>
-                </a:schemeClr>
-              </a:solidFill>
-              <a:latin typeface="Aharoni" pitchFamily="2" charset="-79"/>
-              <a:cs typeface="Aharoni" pitchFamily="2" charset="-79"/>
-            </a:endParaRPr>
-          </a:p>
-        </p:txBody>
-      </p:sp>
-      <p:cxnSp>
-        <p:nvCxnSpPr>
-          <p:cNvPr id="13" name="Straight Arrow Connector 12"/>
-          <p:cNvCxnSpPr>
-            <a:stCxn id="8" idx="3"/>
-            <a:endCxn id="9" idx="1"/>
-          </p:cNvCxnSpPr>
-          <p:nvPr/>
-        </p:nvCxnSpPr>
-        <p:spPr>
-          <a:xfrm>
-            <a:off x="5580112" y="2338611"/>
-            <a:ext cx="758949" cy="8359"/>
-          </a:xfrm>
-          <a:prstGeom prst="straightConnector1">
-            <a:avLst/>
-          </a:prstGeom>
-          <a:ln w="28575">
-            <a:solidFill>
-              <a:schemeClr val="tx1">
-                <a:lumMod val="50000"/>
-                <a:lumOff val="50000"/>
-              </a:schemeClr>
-            </a:solidFill>
-            <a:tailEnd type="stealth" w="lg" len="lg"/>
-          </a:ln>
-        </p:spPr>
-        <p:style>
-          <a:lnRef idx="1">
-            <a:schemeClr val="accent5"/>
-          </a:lnRef>
-          <a:fillRef idx="3">
-            <a:schemeClr val="accent5"/>
-          </a:fillRef>
-          <a:effectRef idx="2">
-            <a:schemeClr val="accent5"/>
-          </a:effectRef>
-          <a:fontRef idx="minor">
-            <a:schemeClr val="lt1"/>
-          </a:fontRef>
-        </p:style>
-      </p:cxnSp>
-      <p:cxnSp>
-        <p:nvCxnSpPr>
-          <p:cNvPr id="16" name="Straight Arrow Connector 15"/>
-          <p:cNvCxnSpPr>
-            <a:endCxn id="5" idx="1"/>
-          </p:cNvCxnSpPr>
-          <p:nvPr/>
-        </p:nvCxnSpPr>
-        <p:spPr>
-          <a:xfrm>
-            <a:off x="971600" y="2346970"/>
-            <a:ext cx="720080" cy="0"/>
-          </a:xfrm>
-          <a:prstGeom prst="straightConnector1">
-            <a:avLst/>
-          </a:prstGeom>
-          <a:ln w="28575">
-            <a:solidFill>
-              <a:schemeClr val="tx1">
-                <a:lumMod val="50000"/>
-                <a:lumOff val="50000"/>
-              </a:schemeClr>
-            </a:solidFill>
-            <a:tailEnd type="stealth" w="lg" len="lg"/>
-          </a:ln>
-        </p:spPr>
-        <p:style>
-          <a:lnRef idx="1">
-            <a:schemeClr val="accent5"/>
-          </a:lnRef>
-          <a:fillRef idx="3">
-            <a:schemeClr val="accent5"/>
-          </a:fillRef>
-          <a:effectRef idx="2">
-            <a:schemeClr val="accent5"/>
-          </a:effectRef>
-          <a:fontRef idx="minor">
-            <a:schemeClr val="lt1"/>
-          </a:fontRef>
-        </p:style>
-      </p:cxnSp>
-      <p:cxnSp>
-        <p:nvCxnSpPr>
-          <p:cNvPr id="25" name="Straight Arrow Connector 24"/>
-          <p:cNvCxnSpPr>
-            <a:stCxn id="9" idx="2"/>
-            <a:endCxn id="10" idx="0"/>
-          </p:cNvCxnSpPr>
-          <p:nvPr/>
-        </p:nvCxnSpPr>
-        <p:spPr>
-          <a:xfrm>
-            <a:off x="7131149" y="2707010"/>
-            <a:ext cx="0" cy="792088"/>
-          </a:xfrm>
-          <a:prstGeom prst="straightConnector1">
-            <a:avLst/>
-          </a:prstGeom>
-          <a:ln w="28575">
-            <a:solidFill>
-              <a:schemeClr val="tx1">
-                <a:lumMod val="50000"/>
-                <a:lumOff val="50000"/>
-              </a:schemeClr>
-            </a:solidFill>
-            <a:tailEnd type="stealth" w="lg" len="lg"/>
-          </a:ln>
-        </p:spPr>
-        <p:style>
-          <a:lnRef idx="1">
-            <a:schemeClr val="accent5"/>
-          </a:lnRef>
-          <a:fillRef idx="3">
-            <a:schemeClr val="accent5"/>
-          </a:fillRef>
-          <a:effectRef idx="2">
-            <a:schemeClr val="accent5"/>
-          </a:effectRef>
-          <a:fontRef idx="minor">
-            <a:schemeClr val="lt1"/>
-          </a:fontRef>
-        </p:style>
-      </p:cxnSp>
-      <p:cxnSp>
-        <p:nvCxnSpPr>
-          <p:cNvPr id="30" name="Straight Arrow Connector 29"/>
-          <p:cNvCxnSpPr>
-            <a:stCxn id="10" idx="1"/>
-            <a:endCxn id="11" idx="3"/>
-          </p:cNvCxnSpPr>
-          <p:nvPr/>
-        </p:nvCxnSpPr>
-        <p:spPr>
-          <a:xfrm flipH="1">
-            <a:off x="5580112" y="3859138"/>
-            <a:ext cx="758949" cy="0"/>
-          </a:xfrm>
-          <a:prstGeom prst="straightConnector1">
-            <a:avLst/>
-          </a:prstGeom>
-          <a:ln w="28575">
-            <a:solidFill>
-              <a:schemeClr val="tx1">
-                <a:lumMod val="50000"/>
-                <a:lumOff val="50000"/>
-              </a:schemeClr>
-            </a:solidFill>
-            <a:tailEnd type="stealth" w="lg" len="lg"/>
-          </a:ln>
-        </p:spPr>
-        <p:style>
-          <a:lnRef idx="1">
-            <a:schemeClr val="accent5"/>
-          </a:lnRef>
-          <a:fillRef idx="3">
-            <a:schemeClr val="accent5"/>
-          </a:fillRef>
-          <a:effectRef idx="2">
-            <a:schemeClr val="accent5"/>
-          </a:effectRef>
-          <a:fontRef idx="minor">
-            <a:schemeClr val="lt1"/>
-          </a:fontRef>
-        </p:style>
-      </p:cxnSp>
-      <p:cxnSp>
-        <p:nvCxnSpPr>
-          <p:cNvPr id="36" name="Straight Arrow Connector 35"/>
-          <p:cNvCxnSpPr>
-            <a:stCxn id="11" idx="1"/>
-            <a:endCxn id="12" idx="3"/>
-          </p:cNvCxnSpPr>
-          <p:nvPr/>
-        </p:nvCxnSpPr>
-        <p:spPr>
-          <a:xfrm flipH="1">
-            <a:off x="3275856" y="3859138"/>
-            <a:ext cx="720080" cy="1910"/>
-          </a:xfrm>
-          <a:prstGeom prst="straightConnector1">
-            <a:avLst/>
-          </a:prstGeom>
-          <a:ln w="28575">
-            <a:solidFill>
-              <a:schemeClr val="tx1">
-                <a:lumMod val="50000"/>
-                <a:lumOff val="50000"/>
-              </a:schemeClr>
-            </a:solidFill>
-            <a:tailEnd type="stealth" w="lg" len="lg"/>
-          </a:ln>
-        </p:spPr>
-        <p:style>
-          <a:lnRef idx="1">
-            <a:schemeClr val="accent5"/>
-          </a:lnRef>
-          <a:fillRef idx="3">
-            <a:schemeClr val="accent5"/>
-          </a:fillRef>
-          <a:effectRef idx="2">
-            <a:schemeClr val="accent5"/>
-          </a:effectRef>
-          <a:fontRef idx="minor">
-            <a:schemeClr val="lt1"/>
-          </a:fontRef>
-        </p:style>
-      </p:cxnSp>
-      <p:cxnSp>
-        <p:nvCxnSpPr>
-          <p:cNvPr id="43" name="Straight Arrow Connector 42"/>
-          <p:cNvCxnSpPr>
-            <a:stCxn id="12" idx="1"/>
-          </p:cNvCxnSpPr>
-          <p:nvPr/>
-        </p:nvCxnSpPr>
-        <p:spPr>
-          <a:xfrm flipH="1">
-            <a:off x="899592" y="3861048"/>
-            <a:ext cx="792088" cy="372"/>
-          </a:xfrm>
-          <a:prstGeom prst="straightConnector1">
-            <a:avLst/>
-          </a:prstGeom>
-          <a:ln w="28575">
-            <a:solidFill>
-              <a:schemeClr val="tx1">
-                <a:lumMod val="50000"/>
-                <a:lumOff val="50000"/>
-              </a:schemeClr>
-            </a:solidFill>
-            <a:tailEnd type="stealth" w="lg" len="lg"/>
-          </a:ln>
-        </p:spPr>
-        <p:style>
-          <a:lnRef idx="1">
-            <a:schemeClr val="accent5"/>
-          </a:lnRef>
-          <a:fillRef idx="3">
-            <a:schemeClr val="accent5"/>
-          </a:fillRef>
-          <a:effectRef idx="2">
-            <a:schemeClr val="accent5"/>
-          </a:effectRef>
-          <a:fontRef idx="minor">
-            <a:schemeClr val="lt1"/>
-          </a:fontRef>
-        </p:style>
-      </p:cxnSp>
-      <p:cxnSp>
-        <p:nvCxnSpPr>
-          <p:cNvPr id="48" name="Straight Arrow Connector 47"/>
-          <p:cNvCxnSpPr>
-            <a:stCxn id="11" idx="0"/>
-            <a:endCxn id="8" idx="2"/>
-          </p:cNvCxnSpPr>
-          <p:nvPr/>
-        </p:nvCxnSpPr>
-        <p:spPr>
-          <a:xfrm flipV="1">
-            <a:off x="4788024" y="2698651"/>
-            <a:ext cx="0" cy="800447"/>
-          </a:xfrm>
-          <a:prstGeom prst="straightConnector1">
-            <a:avLst/>
-          </a:prstGeom>
-          <a:ln w="28575">
-            <a:solidFill>
-              <a:schemeClr val="tx1">
-                <a:lumMod val="50000"/>
-                <a:lumOff val="50000"/>
-              </a:schemeClr>
-            </a:solidFill>
-            <a:tailEnd type="stealth" w="lg" len="lg"/>
-          </a:ln>
-        </p:spPr>
-        <p:style>
-          <a:lnRef idx="1">
-            <a:schemeClr val="accent5"/>
-          </a:lnRef>
-          <a:fillRef idx="3">
-            <a:schemeClr val="accent5"/>
-          </a:fillRef>
-          <a:effectRef idx="2">
-            <a:schemeClr val="accent5"/>
-          </a:effectRef>
-          <a:fontRef idx="minor">
-            <a:schemeClr val="lt1"/>
-          </a:fontRef>
-        </p:style>
-      </p:cxnSp>
-      <p:sp>
-        <p:nvSpPr>
-          <p:cNvPr id="17" name="TextBox 16"/>
+          <p:cNvPr id="5" name="TextBox 4"/>
           <p:cNvSpPr txBox="1"/>
           <p:nvPr/>
         </p:nvSpPr>
         <p:spPr>
           <a:xfrm>
-            <a:off x="596955" y="404664"/>
-            <a:ext cx="8326062" cy="584775"/>
+            <a:off x="827584" y="834971"/>
+            <a:ext cx="8208912" cy="923330"/>
           </a:xfrm>
           <a:prstGeom prst="rect">
             <a:avLst/>
@@ -14460,46 +15115,33 @@
           <a:noFill/>
         </p:spPr>
         <p:txBody>
-          <a:bodyPr wrap="none" rtlCol="0">
+          <a:bodyPr wrap="square" rtlCol="0">
             <a:spAutoFit/>
           </a:bodyPr>
           <a:lstStyle/>
           <a:p>
             <a:r>
-              <a:rPr lang="ru-RU" sz="3200" dirty="0" smtClean="0">
-                <a:solidFill>
-                  <a:schemeClr val="tx1">
-                    <a:lumMod val="65000"/>
-                    <a:lumOff val="35000"/>
-                  </a:schemeClr>
-                </a:solidFill>
-                <a:latin typeface="Arial" panose="020B0604020202020204" pitchFamily="34" charset="0"/>
-                <a:cs typeface="Arial" panose="020B0604020202020204" pitchFamily="34" charset="0"/>
-              </a:rPr>
-              <a:t>Традиционные подходы к разработке ПО</a:t>
-            </a:r>
-            <a:endParaRPr lang="en-US" sz="3000" dirty="0">
-              <a:solidFill>
-                <a:schemeClr val="tx1">
-                  <a:lumMod val="65000"/>
-                  <a:lumOff val="35000"/>
-                </a:schemeClr>
-              </a:solidFill>
-              <a:effectLst>
-                <a:outerShdw blurRad="38100" dist="38100" dir="2700000" algn="tl">
-                  <a:srgbClr val="000000">
-                    <a:alpha val="43137"/>
-                  </a:srgbClr>
-                </a:outerShdw>
-              </a:effectLst>
-            </a:endParaRPr>
+              <a:rPr lang="en-US" dirty="0"/>
+              <a:t>Each phase must be completed before the next phase begins.  </a:t>
+            </a:r>
+            <a:endParaRPr lang="en-US" dirty="0" smtClean="0"/>
+          </a:p>
+          <a:p>
+            <a:r>
+              <a:rPr lang="en-US" dirty="0" smtClean="0"/>
+              <a:t>Testing </a:t>
+            </a:r>
+            <a:r>
+              <a:rPr lang="en-US" dirty="0"/>
+              <a:t>of the product is planned in parallel with a corresponding phase of development</a:t>
+            </a:r>
           </a:p>
         </p:txBody>
       </p:sp>
     </p:spTree>
     <p:extLst>
       <p:ext uri="{BB962C8B-B14F-4D97-AF65-F5344CB8AC3E}">
-        <p14:creationId xmlns:p14="http://schemas.microsoft.com/office/powerpoint/2010/main" val="802213652"/>
+        <p14:creationId xmlns:p14="http://schemas.microsoft.com/office/powerpoint/2010/main" val="1148965532"/>
       </p:ext>
     </p:extLst>
   </p:cSld>

</xml_diff>